<commit_message>
[837] Revise design.md to match architecture diagram Fixes #837
</commit_message>
<xml_diff>
--- a/docs/images/design/design.pptx
+++ b/docs/images/design/design.pptx
@@ -6,6 +6,9 @@
   </p:sldMasterIdLst>
   <p:sldIdLst>
     <p:sldId id="256" r:id="rId2"/>
+    <p:sldId id="258" r:id="rId3"/>
+    <p:sldId id="259" r:id="rId4"/>
+    <p:sldId id="257" r:id="rId5"/>
   </p:sldIdLst>
   <p:sldSz cx="9144000" cy="6858000" type="screen4x3"/>
   <p:notesSz cx="6858000" cy="9144000"/>
@@ -4415,6 +4418,2265 @@
     <p:extLst>
       <p:ext uri="{BB962C8B-B14F-4D97-AF65-F5344CB8AC3E}">
         <p14:creationId xmlns:p14="http://schemas.microsoft.com/office/powerpoint/2010/main" val="471720614"/>
+      </p:ext>
+    </p:extLst>
+  </p:cSld>
+  <p:clrMapOvr>
+    <a:masterClrMapping/>
+  </p:clrMapOvr>
+</p:sld>
+</file>
+
+<file path=ppt/slides/slide2.xml><?xml version="1.0" encoding="utf-8"?>
+<p:sld xmlns:a="http://schemas.openxmlformats.org/drawingml/2006/main" xmlns:r="http://schemas.openxmlformats.org/officeDocument/2006/relationships" xmlns:p="http://schemas.openxmlformats.org/presentationml/2006/main">
+  <p:cSld>
+    <p:spTree>
+      <p:nvGrpSpPr>
+        <p:cNvPr id="1" name=""/>
+        <p:cNvGrpSpPr/>
+        <p:nvPr/>
+      </p:nvGrpSpPr>
+      <p:grpSpPr>
+        <a:xfrm>
+          <a:off x="0" y="0"/>
+          <a:ext cx="0" cy="0"/>
+          <a:chOff x="0" y="0"/>
+          <a:chExt cx="0" cy="0"/>
+        </a:xfrm>
+      </p:grpSpPr>
+      <p:sp>
+        <p:nvSpPr>
+          <p:cNvPr id="48" name="Rectangle 47"/>
+          <p:cNvSpPr/>
+          <p:nvPr/>
+        </p:nvSpPr>
+        <p:spPr>
+          <a:xfrm>
+            <a:off x="1260474" y="2590800"/>
+            <a:ext cx="6435725" cy="3657600"/>
+          </a:xfrm>
+          <a:prstGeom prst="rect">
+            <a:avLst/>
+          </a:prstGeom>
+          <a:solidFill>
+            <a:schemeClr val="accent4">
+              <a:lumMod val="20000"/>
+              <a:lumOff val="80000"/>
+            </a:schemeClr>
+          </a:solidFill>
+          <a:ln>
+            <a:noFill/>
+          </a:ln>
+        </p:spPr>
+        <p:style>
+          <a:lnRef idx="2">
+            <a:schemeClr val="accent1">
+              <a:shade val="50000"/>
+            </a:schemeClr>
+          </a:lnRef>
+          <a:fillRef idx="1">
+            <a:schemeClr val="accent1"/>
+          </a:fillRef>
+          <a:effectRef idx="0">
+            <a:schemeClr val="accent1"/>
+          </a:effectRef>
+          <a:fontRef idx="minor">
+            <a:schemeClr val="lt1"/>
+          </a:fontRef>
+        </p:style>
+        <p:txBody>
+          <a:bodyPr rtlCol="0" anchor="t"/>
+          <a:lstStyle/>
+          <a:p>
+            <a:r>
+              <a:rPr lang="en-US" b="1" dirty="0" smtClean="0"/>
+              <a:t>UI</a:t>
+            </a:r>
+            <a:endParaRPr lang="en-SG" b="1" dirty="0"/>
+          </a:p>
+        </p:txBody>
+      </p:sp>
+      <p:sp>
+        <p:nvSpPr>
+          <p:cNvPr id="47" name="Rounded Rectangle 46"/>
+          <p:cNvSpPr/>
+          <p:nvPr/>
+        </p:nvSpPr>
+        <p:spPr>
+          <a:xfrm>
+            <a:off x="5715000" y="3352800"/>
+            <a:ext cx="1752600" cy="2743200"/>
+          </a:xfrm>
+          <a:prstGeom prst="roundRect">
+            <a:avLst>
+              <a:gd name="adj" fmla="val 5097"/>
+            </a:avLst>
+          </a:prstGeom>
+          <a:solidFill>
+            <a:schemeClr val="accent4">
+              <a:lumMod val="40000"/>
+              <a:lumOff val="60000"/>
+            </a:schemeClr>
+          </a:solidFill>
+          <a:ln>
+            <a:noFill/>
+          </a:ln>
+        </p:spPr>
+        <p:style>
+          <a:lnRef idx="2">
+            <a:schemeClr val="accent1">
+              <a:shade val="50000"/>
+            </a:schemeClr>
+          </a:lnRef>
+          <a:fillRef idx="1">
+            <a:schemeClr val="accent1"/>
+          </a:fillRef>
+          <a:effectRef idx="0">
+            <a:schemeClr val="accent1"/>
+          </a:effectRef>
+          <a:fontRef idx="minor">
+            <a:schemeClr val="lt1"/>
+          </a:fontRef>
+        </p:style>
+        <p:txBody>
+          <a:bodyPr rtlCol="0" anchor="t"/>
+          <a:lstStyle/>
+          <a:p>
+            <a:r>
+              <a:rPr lang="en-US" dirty="0"/>
+              <a:t>Browser View</a:t>
+            </a:r>
+            <a:endParaRPr lang="en-SG" dirty="0"/>
+          </a:p>
+        </p:txBody>
+      </p:sp>
+      <p:sp>
+        <p:nvSpPr>
+          <p:cNvPr id="5" name="Rounded Rectangle 4"/>
+          <p:cNvSpPr/>
+          <p:nvPr/>
+        </p:nvSpPr>
+        <p:spPr>
+          <a:xfrm>
+            <a:off x="1752600" y="3352800"/>
+            <a:ext cx="3733800" cy="2743200"/>
+          </a:xfrm>
+          <a:prstGeom prst="roundRect">
+            <a:avLst>
+              <a:gd name="adj" fmla="val 4007"/>
+            </a:avLst>
+          </a:prstGeom>
+          <a:solidFill>
+            <a:schemeClr val="accent4">
+              <a:lumMod val="40000"/>
+              <a:lumOff val="60000"/>
+            </a:schemeClr>
+          </a:solidFill>
+          <a:ln>
+            <a:noFill/>
+          </a:ln>
+        </p:spPr>
+        <p:style>
+          <a:lnRef idx="2">
+            <a:schemeClr val="accent1">
+              <a:shade val="50000"/>
+            </a:schemeClr>
+          </a:lnRef>
+          <a:fillRef idx="1">
+            <a:schemeClr val="accent1"/>
+          </a:fillRef>
+          <a:effectRef idx="0">
+            <a:schemeClr val="accent1"/>
+          </a:effectRef>
+          <a:fontRef idx="minor">
+            <a:schemeClr val="lt1"/>
+          </a:fontRef>
+        </p:style>
+        <p:txBody>
+          <a:bodyPr rtlCol="0" anchor="t"/>
+          <a:lstStyle/>
+          <a:p>
+            <a:r>
+              <a:rPr lang="en-US" dirty="0" smtClean="0"/>
+              <a:t>Panel View</a:t>
+            </a:r>
+            <a:endParaRPr lang="en-SG" dirty="0"/>
+          </a:p>
+        </p:txBody>
+      </p:sp>
+      <p:sp>
+        <p:nvSpPr>
+          <p:cNvPr id="4" name="Rectangle 3"/>
+          <p:cNvSpPr/>
+          <p:nvPr/>
+        </p:nvSpPr>
+        <p:spPr>
+          <a:xfrm>
+            <a:off x="3124200" y="2819400"/>
+            <a:ext cx="838200" cy="381000"/>
+          </a:xfrm>
+          <a:prstGeom prst="rect">
+            <a:avLst/>
+          </a:prstGeom>
+          <a:solidFill>
+            <a:srgbClr val="7030A0"/>
+          </a:solidFill>
+          <a:ln>
+            <a:noFill/>
+          </a:ln>
+        </p:spPr>
+        <p:style>
+          <a:lnRef idx="2">
+            <a:schemeClr val="accent1">
+              <a:shade val="50000"/>
+            </a:schemeClr>
+          </a:lnRef>
+          <a:fillRef idx="1">
+            <a:schemeClr val="accent1"/>
+          </a:fillRef>
+          <a:effectRef idx="0">
+            <a:schemeClr val="accent1"/>
+          </a:effectRef>
+          <a:fontRef idx="minor">
+            <a:schemeClr val="lt1"/>
+          </a:fontRef>
+        </p:style>
+        <p:txBody>
+          <a:bodyPr rtlCol="0" anchor="ctr"/>
+          <a:lstStyle/>
+          <a:p>
+            <a:pPr algn="ctr"/>
+            <a:r>
+              <a:rPr lang="en-US" dirty="0"/>
+              <a:t>UI</a:t>
+            </a:r>
+            <a:endParaRPr lang="en-SG" dirty="0"/>
+          </a:p>
+        </p:txBody>
+      </p:sp>
+      <p:sp>
+        <p:nvSpPr>
+          <p:cNvPr id="7" name="Rectangle 6"/>
+          <p:cNvSpPr/>
+          <p:nvPr/>
+        </p:nvSpPr>
+        <p:spPr>
+          <a:xfrm>
+            <a:off x="2057400" y="3989723"/>
+            <a:ext cx="838200" cy="381000"/>
+          </a:xfrm>
+          <a:prstGeom prst="rect">
+            <a:avLst/>
+          </a:prstGeom>
+          <a:solidFill>
+            <a:srgbClr val="7030A0"/>
+          </a:solidFill>
+          <a:ln>
+            <a:noFill/>
+          </a:ln>
+        </p:spPr>
+        <p:style>
+          <a:lnRef idx="2">
+            <a:schemeClr val="accent1">
+              <a:shade val="50000"/>
+            </a:schemeClr>
+          </a:lnRef>
+          <a:fillRef idx="1">
+            <a:schemeClr val="accent1"/>
+          </a:fillRef>
+          <a:effectRef idx="0">
+            <a:schemeClr val="accent1"/>
+          </a:effectRef>
+          <a:fontRef idx="minor">
+            <a:schemeClr val="lt1"/>
+          </a:fontRef>
+        </p:style>
+        <p:txBody>
+          <a:bodyPr rtlCol="0" anchor="ctr"/>
+          <a:lstStyle/>
+          <a:p>
+            <a:pPr algn="ctr"/>
+            <a:r>
+              <a:rPr lang="en-US" dirty="0" smtClean="0"/>
+              <a:t>Menu</a:t>
+            </a:r>
+            <a:endParaRPr lang="en-SG" dirty="0"/>
+          </a:p>
+        </p:txBody>
+      </p:sp>
+      <p:sp>
+        <p:nvSpPr>
+          <p:cNvPr id="8" name="Rectangle 7"/>
+          <p:cNvSpPr/>
+          <p:nvPr/>
+        </p:nvSpPr>
+        <p:spPr>
+          <a:xfrm>
+            <a:off x="3127375" y="3989723"/>
+            <a:ext cx="838200" cy="381000"/>
+          </a:xfrm>
+          <a:prstGeom prst="rect">
+            <a:avLst/>
+          </a:prstGeom>
+          <a:solidFill>
+            <a:srgbClr val="7030A0"/>
+          </a:solidFill>
+          <a:ln>
+            <a:noFill/>
+          </a:ln>
+        </p:spPr>
+        <p:style>
+          <a:lnRef idx="2">
+            <a:schemeClr val="accent1">
+              <a:shade val="50000"/>
+            </a:schemeClr>
+          </a:lnRef>
+          <a:fillRef idx="1">
+            <a:schemeClr val="accent1"/>
+          </a:fillRef>
+          <a:effectRef idx="0">
+            <a:schemeClr val="accent1"/>
+          </a:effectRef>
+          <a:fontRef idx="minor">
+            <a:schemeClr val="lt1"/>
+          </a:fontRef>
+        </p:style>
+        <p:txBody>
+          <a:bodyPr rtlCol="0" anchor="ctr"/>
+          <a:lstStyle/>
+          <a:p>
+            <a:pPr algn="ctr"/>
+            <a:r>
+              <a:rPr lang="en-US" dirty="0" smtClean="0"/>
+              <a:t>Panels</a:t>
+            </a:r>
+            <a:endParaRPr lang="en-SG" dirty="0"/>
+          </a:p>
+        </p:txBody>
+      </p:sp>
+      <p:cxnSp>
+        <p:nvCxnSpPr>
+          <p:cNvPr id="12" name="Elbow Connector 11"/>
+          <p:cNvCxnSpPr>
+            <a:stCxn id="4" idx="2"/>
+            <a:endCxn id="7" idx="0"/>
+          </p:cNvCxnSpPr>
+          <p:nvPr/>
+        </p:nvCxnSpPr>
+        <p:spPr>
+          <a:xfrm rot="5400000">
+            <a:off x="2615239" y="3061661"/>
+            <a:ext cx="789323" cy="1066800"/>
+          </a:xfrm>
+          <a:prstGeom prst="bentConnector3">
+            <a:avLst>
+              <a:gd name="adj1" fmla="val 74574"/>
+            </a:avLst>
+          </a:prstGeom>
+          <a:ln w="19050">
+            <a:solidFill>
+              <a:srgbClr val="7030A0"/>
+            </a:solidFill>
+            <a:headEnd type="none" w="med" len="med"/>
+            <a:tailEnd type="triangle" w="med" len="med"/>
+          </a:ln>
+        </p:spPr>
+        <p:style>
+          <a:lnRef idx="1">
+            <a:schemeClr val="accent1"/>
+          </a:lnRef>
+          <a:fillRef idx="0">
+            <a:schemeClr val="accent1"/>
+          </a:fillRef>
+          <a:effectRef idx="0">
+            <a:schemeClr val="accent1"/>
+          </a:effectRef>
+          <a:fontRef idx="minor">
+            <a:schemeClr val="tx1"/>
+          </a:fontRef>
+        </p:style>
+      </p:cxnSp>
+      <p:cxnSp>
+        <p:nvCxnSpPr>
+          <p:cNvPr id="14" name="Elbow Connector 13"/>
+          <p:cNvCxnSpPr>
+            <a:stCxn id="4" idx="2"/>
+            <a:endCxn id="8" idx="0"/>
+          </p:cNvCxnSpPr>
+          <p:nvPr/>
+        </p:nvCxnSpPr>
+        <p:spPr>
+          <a:xfrm rot="16200000" flipH="1">
+            <a:off x="3150226" y="3593473"/>
+            <a:ext cx="789323" cy="3175"/>
+          </a:xfrm>
+          <a:prstGeom prst="bentConnector3">
+            <a:avLst>
+              <a:gd name="adj1" fmla="val 50000"/>
+            </a:avLst>
+          </a:prstGeom>
+          <a:ln w="19050">
+            <a:solidFill>
+              <a:srgbClr val="7030A0"/>
+            </a:solidFill>
+            <a:headEnd type="none" w="med" len="med"/>
+            <a:tailEnd type="triangle" w="med" len="med"/>
+          </a:ln>
+        </p:spPr>
+        <p:style>
+          <a:lnRef idx="1">
+            <a:schemeClr val="accent1"/>
+          </a:lnRef>
+          <a:fillRef idx="0">
+            <a:schemeClr val="accent1"/>
+          </a:fillRef>
+          <a:effectRef idx="0">
+            <a:schemeClr val="accent1"/>
+          </a:effectRef>
+          <a:fontRef idx="minor">
+            <a:schemeClr val="tx1"/>
+          </a:fontRef>
+        </p:style>
+      </p:cxnSp>
+      <p:cxnSp>
+        <p:nvCxnSpPr>
+          <p:cNvPr id="17" name="Elbow Connector 16"/>
+          <p:cNvCxnSpPr>
+            <a:stCxn id="4" idx="2"/>
+            <a:endCxn id="9" idx="0"/>
+          </p:cNvCxnSpPr>
+          <p:nvPr/>
+        </p:nvCxnSpPr>
+        <p:spPr>
+          <a:xfrm rot="16200000" flipH="1">
+            <a:off x="4692561" y="2051139"/>
+            <a:ext cx="787579" cy="3086100"/>
+          </a:xfrm>
+          <a:prstGeom prst="bentConnector3">
+            <a:avLst>
+              <a:gd name="adj1" fmla="val 74628"/>
+            </a:avLst>
+          </a:prstGeom>
+          <a:ln w="19050">
+            <a:solidFill>
+              <a:srgbClr val="7030A0"/>
+            </a:solidFill>
+            <a:headEnd type="none" w="med" len="med"/>
+            <a:tailEnd type="triangle" w="med" len="med"/>
+          </a:ln>
+        </p:spPr>
+        <p:style>
+          <a:lnRef idx="1">
+            <a:schemeClr val="accent1"/>
+          </a:lnRef>
+          <a:fillRef idx="0">
+            <a:schemeClr val="accent1"/>
+          </a:fillRef>
+          <a:effectRef idx="0">
+            <a:schemeClr val="accent1"/>
+          </a:effectRef>
+          <a:fontRef idx="minor">
+            <a:schemeClr val="tx1"/>
+          </a:fontRef>
+        </p:style>
+      </p:cxnSp>
+      <p:sp>
+        <p:nvSpPr>
+          <p:cNvPr id="22" name="Rectangle 21"/>
+          <p:cNvSpPr/>
+          <p:nvPr/>
+        </p:nvSpPr>
+        <p:spPr>
+          <a:xfrm>
+            <a:off x="3127375" y="4724400"/>
+            <a:ext cx="838200" cy="381000"/>
+          </a:xfrm>
+          <a:prstGeom prst="rect">
+            <a:avLst/>
+          </a:prstGeom>
+          <a:solidFill>
+            <a:srgbClr val="7030A0"/>
+          </a:solidFill>
+          <a:ln>
+            <a:noFill/>
+          </a:ln>
+        </p:spPr>
+        <p:style>
+          <a:lnRef idx="2">
+            <a:schemeClr val="accent1">
+              <a:shade val="50000"/>
+            </a:schemeClr>
+          </a:lnRef>
+          <a:fillRef idx="1">
+            <a:schemeClr val="accent1"/>
+          </a:fillRef>
+          <a:effectRef idx="0">
+            <a:schemeClr val="accent1"/>
+          </a:effectRef>
+          <a:fontRef idx="minor">
+            <a:schemeClr val="lt1"/>
+          </a:fontRef>
+        </p:style>
+        <p:txBody>
+          <a:bodyPr rtlCol="0" anchor="ctr"/>
+          <a:lstStyle/>
+          <a:p>
+            <a:pPr algn="ctr"/>
+            <a:r>
+              <a:rPr lang="en-US" dirty="0" smtClean="0"/>
+              <a:t>Panel</a:t>
+            </a:r>
+            <a:endParaRPr lang="en-SG" dirty="0"/>
+          </a:p>
+        </p:txBody>
+      </p:sp>
+      <p:cxnSp>
+        <p:nvCxnSpPr>
+          <p:cNvPr id="23" name="Straight Arrow Connector 22"/>
+          <p:cNvCxnSpPr>
+            <a:stCxn id="8" idx="2"/>
+          </p:cNvCxnSpPr>
+          <p:nvPr/>
+        </p:nvCxnSpPr>
+        <p:spPr>
+          <a:xfrm flipH="1">
+            <a:off x="3543301" y="4370723"/>
+            <a:ext cx="3174" cy="353677"/>
+          </a:xfrm>
+          <a:prstGeom prst="straightConnector1">
+            <a:avLst/>
+          </a:prstGeom>
+          <a:ln w="19050">
+            <a:solidFill>
+              <a:srgbClr val="7030A0"/>
+            </a:solidFill>
+            <a:headEnd type="none" w="med" len="med"/>
+            <a:tailEnd type="triangle" w="med" len="med"/>
+          </a:ln>
+        </p:spPr>
+        <p:style>
+          <a:lnRef idx="1">
+            <a:schemeClr val="accent1"/>
+          </a:lnRef>
+          <a:fillRef idx="0">
+            <a:schemeClr val="accent1"/>
+          </a:fillRef>
+          <a:effectRef idx="0">
+            <a:schemeClr val="accent1"/>
+          </a:effectRef>
+          <a:fontRef idx="minor">
+            <a:schemeClr val="tx1"/>
+          </a:fontRef>
+        </p:style>
+      </p:cxnSp>
+      <p:sp>
+        <p:nvSpPr>
+          <p:cNvPr id="41" name="Rectangle 40"/>
+          <p:cNvSpPr/>
+          <p:nvPr/>
+        </p:nvSpPr>
+        <p:spPr>
+          <a:xfrm>
+            <a:off x="2590800" y="5410200"/>
+            <a:ext cx="838200" cy="381000"/>
+          </a:xfrm>
+          <a:prstGeom prst="rect">
+            <a:avLst/>
+          </a:prstGeom>
+          <a:solidFill>
+            <a:srgbClr val="7030A0"/>
+          </a:solidFill>
+          <a:ln>
+            <a:noFill/>
+          </a:ln>
+        </p:spPr>
+        <p:style>
+          <a:lnRef idx="2">
+            <a:schemeClr val="accent1">
+              <a:shade val="50000"/>
+            </a:schemeClr>
+          </a:lnRef>
+          <a:fillRef idx="1">
+            <a:schemeClr val="accent1"/>
+          </a:fillRef>
+          <a:effectRef idx="0">
+            <a:schemeClr val="accent1"/>
+          </a:effectRef>
+          <a:fontRef idx="minor">
+            <a:schemeClr val="lt1"/>
+          </a:fontRef>
+        </p:style>
+        <p:txBody>
+          <a:bodyPr rtlCol="0" anchor="ctr"/>
+          <a:lstStyle/>
+          <a:p>
+            <a:pPr algn="ctr"/>
+            <a:r>
+              <a:rPr lang="en-US" dirty="0" smtClean="0"/>
+              <a:t>Filters</a:t>
+            </a:r>
+            <a:endParaRPr lang="en-SG" dirty="0"/>
+          </a:p>
+        </p:txBody>
+      </p:sp>
+      <p:sp>
+        <p:nvSpPr>
+          <p:cNvPr id="42" name="Rectangle 41"/>
+          <p:cNvSpPr/>
+          <p:nvPr/>
+        </p:nvSpPr>
+        <p:spPr>
+          <a:xfrm>
+            <a:off x="3654425" y="5408457"/>
+            <a:ext cx="990600" cy="381000"/>
+          </a:xfrm>
+          <a:prstGeom prst="rect">
+            <a:avLst/>
+          </a:prstGeom>
+          <a:solidFill>
+            <a:srgbClr val="7030A0"/>
+          </a:solidFill>
+          <a:ln>
+            <a:noFill/>
+          </a:ln>
+        </p:spPr>
+        <p:style>
+          <a:lnRef idx="2">
+            <a:schemeClr val="accent1">
+              <a:shade val="50000"/>
+            </a:schemeClr>
+          </a:lnRef>
+          <a:fillRef idx="1">
+            <a:schemeClr val="accent1"/>
+          </a:fillRef>
+          <a:effectRef idx="0">
+            <a:schemeClr val="accent1"/>
+          </a:effectRef>
+          <a:fontRef idx="minor">
+            <a:schemeClr val="lt1"/>
+          </a:fontRef>
+        </p:style>
+        <p:txBody>
+          <a:bodyPr rtlCol="0" anchor="ctr"/>
+          <a:lstStyle/>
+          <a:p>
+            <a:pPr algn="ctr"/>
+            <a:r>
+              <a:rPr lang="en-US" dirty="0" err="1" smtClean="0"/>
+              <a:t>ListView</a:t>
+            </a:r>
+            <a:endParaRPr lang="en-SG" dirty="0"/>
+          </a:p>
+        </p:txBody>
+      </p:sp>
+      <p:cxnSp>
+        <p:nvCxnSpPr>
+          <p:cNvPr id="43" name="Elbow Connector 42"/>
+          <p:cNvCxnSpPr>
+            <a:stCxn id="22" idx="2"/>
+            <a:endCxn id="41" idx="0"/>
+          </p:cNvCxnSpPr>
+          <p:nvPr/>
+        </p:nvCxnSpPr>
+        <p:spPr>
+          <a:xfrm rot="5400000">
+            <a:off x="3125788" y="4989513"/>
+            <a:ext cx="304800" cy="536575"/>
+          </a:xfrm>
+          <a:prstGeom prst="bentConnector3">
+            <a:avLst>
+              <a:gd name="adj1" fmla="val 50000"/>
+            </a:avLst>
+          </a:prstGeom>
+          <a:ln w="19050">
+            <a:solidFill>
+              <a:srgbClr val="7030A0"/>
+            </a:solidFill>
+            <a:headEnd type="none" w="med" len="med"/>
+            <a:tailEnd type="triangle" w="med" len="med"/>
+          </a:ln>
+        </p:spPr>
+        <p:style>
+          <a:lnRef idx="1">
+            <a:schemeClr val="accent1"/>
+          </a:lnRef>
+          <a:fillRef idx="0">
+            <a:schemeClr val="accent1"/>
+          </a:fillRef>
+          <a:effectRef idx="0">
+            <a:schemeClr val="accent1"/>
+          </a:effectRef>
+          <a:fontRef idx="minor">
+            <a:schemeClr val="tx1"/>
+          </a:fontRef>
+        </p:style>
+      </p:cxnSp>
+      <p:cxnSp>
+        <p:nvCxnSpPr>
+          <p:cNvPr id="44" name="Elbow Connector 43"/>
+          <p:cNvCxnSpPr>
+            <a:stCxn id="22" idx="2"/>
+            <a:endCxn id="42" idx="0"/>
+          </p:cNvCxnSpPr>
+          <p:nvPr/>
+        </p:nvCxnSpPr>
+        <p:spPr>
+          <a:xfrm rot="16200000" flipH="1">
+            <a:off x="3696572" y="4955303"/>
+            <a:ext cx="303057" cy="603250"/>
+          </a:xfrm>
+          <a:prstGeom prst="bentConnector3">
+            <a:avLst>
+              <a:gd name="adj1" fmla="val 50000"/>
+            </a:avLst>
+          </a:prstGeom>
+          <a:ln w="19050">
+            <a:solidFill>
+              <a:srgbClr val="7030A0"/>
+            </a:solidFill>
+            <a:headEnd type="none" w="med" len="med"/>
+            <a:tailEnd type="triangle" w="med" len="med"/>
+          </a:ln>
+        </p:spPr>
+        <p:style>
+          <a:lnRef idx="1">
+            <a:schemeClr val="accent1"/>
+          </a:lnRef>
+          <a:fillRef idx="0">
+            <a:schemeClr val="accent1"/>
+          </a:fillRef>
+          <a:effectRef idx="0">
+            <a:schemeClr val="accent1"/>
+          </a:effectRef>
+          <a:fontRef idx="minor">
+            <a:schemeClr val="tx1"/>
+          </a:fontRef>
+        </p:style>
+      </p:cxnSp>
+      <p:sp>
+        <p:nvSpPr>
+          <p:cNvPr id="9" name="Rectangle 8"/>
+          <p:cNvSpPr/>
+          <p:nvPr/>
+        </p:nvSpPr>
+        <p:spPr>
+          <a:xfrm>
+            <a:off x="5943600" y="3987979"/>
+            <a:ext cx="1371600" cy="559581"/>
+          </a:xfrm>
+          <a:prstGeom prst="rect">
+            <a:avLst/>
+          </a:prstGeom>
+          <a:solidFill>
+            <a:srgbClr val="7030A0"/>
+          </a:solidFill>
+          <a:ln>
+            <a:noFill/>
+          </a:ln>
+        </p:spPr>
+        <p:style>
+          <a:lnRef idx="2">
+            <a:schemeClr val="accent1">
+              <a:shade val="50000"/>
+            </a:schemeClr>
+          </a:lnRef>
+          <a:fillRef idx="1">
+            <a:schemeClr val="accent1"/>
+          </a:fillRef>
+          <a:effectRef idx="0">
+            <a:schemeClr val="accent1"/>
+          </a:effectRef>
+          <a:fontRef idx="minor">
+            <a:schemeClr val="lt1"/>
+          </a:fontRef>
+        </p:style>
+        <p:txBody>
+          <a:bodyPr rtlCol="0" anchor="ctr"/>
+          <a:lstStyle/>
+          <a:p>
+            <a:pPr algn="ctr"/>
+            <a:r>
+              <a:rPr lang="en-US" dirty="0" smtClean="0"/>
+              <a:t>Browser</a:t>
+            </a:r>
+            <a:br>
+              <a:rPr lang="en-US" dirty="0" smtClean="0"/>
+            </a:br>
+            <a:r>
+              <a:rPr lang="en-US" dirty="0" smtClean="0"/>
+              <a:t>Component</a:t>
+            </a:r>
+            <a:endParaRPr lang="en-SG" dirty="0"/>
+          </a:p>
+        </p:txBody>
+      </p:sp>
+      <p:cxnSp>
+        <p:nvCxnSpPr>
+          <p:cNvPr id="54" name="Straight Arrow Connector 53"/>
+          <p:cNvCxnSpPr/>
+          <p:nvPr/>
+        </p:nvCxnSpPr>
+        <p:spPr>
+          <a:xfrm flipH="1">
+            <a:off x="6629401" y="4523122"/>
+            <a:ext cx="3174" cy="353677"/>
+          </a:xfrm>
+          <a:prstGeom prst="straightConnector1">
+            <a:avLst/>
+          </a:prstGeom>
+          <a:ln w="19050">
+            <a:solidFill>
+              <a:srgbClr val="7030A0"/>
+            </a:solidFill>
+            <a:headEnd type="none" w="med" len="med"/>
+            <a:tailEnd type="triangle" w="med" len="med"/>
+          </a:ln>
+        </p:spPr>
+        <p:style>
+          <a:lnRef idx="1">
+            <a:schemeClr val="accent1"/>
+          </a:lnRef>
+          <a:fillRef idx="0">
+            <a:schemeClr val="accent1"/>
+          </a:fillRef>
+          <a:effectRef idx="0">
+            <a:schemeClr val="accent1"/>
+          </a:effectRef>
+          <a:fontRef idx="minor">
+            <a:schemeClr val="tx1"/>
+          </a:fontRef>
+        </p:style>
+      </p:cxnSp>
+    </p:spTree>
+    <p:extLst>
+      <p:ext uri="{BB962C8B-B14F-4D97-AF65-F5344CB8AC3E}">
+        <p14:creationId xmlns:p14="http://schemas.microsoft.com/office/powerpoint/2010/main" val="4232904900"/>
+      </p:ext>
+    </p:extLst>
+  </p:cSld>
+  <p:clrMapOvr>
+    <a:masterClrMapping/>
+  </p:clrMapOvr>
+</p:sld>
+</file>
+
+<file path=ppt/slides/slide3.xml><?xml version="1.0" encoding="utf-8"?>
+<p:sld xmlns:a="http://schemas.openxmlformats.org/drawingml/2006/main" xmlns:r="http://schemas.openxmlformats.org/officeDocument/2006/relationships" xmlns:p="http://schemas.openxmlformats.org/presentationml/2006/main">
+  <p:cSld>
+    <p:spTree>
+      <p:nvGrpSpPr>
+        <p:cNvPr id="1" name=""/>
+        <p:cNvGrpSpPr/>
+        <p:nvPr/>
+      </p:nvGrpSpPr>
+      <p:grpSpPr>
+        <a:xfrm>
+          <a:off x="0" y="0"/>
+          <a:ext cx="0" cy="0"/>
+          <a:chOff x="0" y="0"/>
+          <a:chExt cx="0" cy="0"/>
+        </a:xfrm>
+      </p:grpSpPr>
+      <p:sp>
+        <p:nvSpPr>
+          <p:cNvPr id="3" name="Rectangle 47"/>
+          <p:cNvSpPr/>
+          <p:nvPr/>
+        </p:nvSpPr>
+        <p:spPr>
+          <a:xfrm>
+            <a:off x="1143000" y="2743200"/>
+            <a:ext cx="6435725" cy="1676400"/>
+          </a:xfrm>
+          <a:prstGeom prst="rect">
+            <a:avLst/>
+          </a:prstGeom>
+          <a:solidFill>
+            <a:schemeClr val="accent3">
+              <a:lumMod val="20000"/>
+              <a:lumOff val="80000"/>
+            </a:schemeClr>
+          </a:solidFill>
+          <a:ln>
+            <a:noFill/>
+          </a:ln>
+        </p:spPr>
+        <p:style>
+          <a:lnRef idx="2">
+            <a:schemeClr val="accent1">
+              <a:shade val="50000"/>
+            </a:schemeClr>
+          </a:lnRef>
+          <a:fillRef idx="1">
+            <a:schemeClr val="accent1"/>
+          </a:fillRef>
+          <a:effectRef idx="0">
+            <a:schemeClr val="accent1"/>
+          </a:effectRef>
+          <a:fontRef idx="minor">
+            <a:schemeClr val="lt1"/>
+          </a:fontRef>
+        </p:style>
+        <p:txBody>
+          <a:bodyPr rtlCol="0" anchor="t"/>
+          <a:lstStyle/>
+          <a:p>
+            <a:r>
+              <a:rPr lang="en-US" b="1" dirty="0" smtClean="0"/>
+              <a:t>Filters</a:t>
+            </a:r>
+            <a:endParaRPr lang="en-SG" b="1" dirty="0"/>
+          </a:p>
+        </p:txBody>
+      </p:sp>
+      <p:sp>
+        <p:nvSpPr>
+          <p:cNvPr id="4" name="Rectangle 21"/>
+          <p:cNvSpPr/>
+          <p:nvPr/>
+        </p:nvSpPr>
+        <p:spPr>
+          <a:xfrm>
+            <a:off x="3009900" y="2895600"/>
+            <a:ext cx="1907443" cy="381000"/>
+          </a:xfrm>
+          <a:prstGeom prst="rect">
+            <a:avLst/>
+          </a:prstGeom>
+          <a:solidFill>
+            <a:schemeClr val="accent3"/>
+          </a:solidFill>
+          <a:ln>
+            <a:noFill/>
+          </a:ln>
+        </p:spPr>
+        <p:style>
+          <a:lnRef idx="2">
+            <a:schemeClr val="accent1">
+              <a:shade val="50000"/>
+            </a:schemeClr>
+          </a:lnRef>
+          <a:fillRef idx="1">
+            <a:schemeClr val="accent1"/>
+          </a:fillRef>
+          <a:effectRef idx="0">
+            <a:schemeClr val="accent1"/>
+          </a:effectRef>
+          <a:fontRef idx="minor">
+            <a:schemeClr val="lt1"/>
+          </a:fontRef>
+        </p:style>
+        <p:txBody>
+          <a:bodyPr rtlCol="0" anchor="ctr"/>
+          <a:lstStyle/>
+          <a:p>
+            <a:pPr algn="ctr"/>
+            <a:r>
+              <a:rPr lang="en-US" dirty="0" err="1" smtClean="0"/>
+              <a:t>FilterExpression</a:t>
+            </a:r>
+            <a:endParaRPr lang="en-SG" dirty="0"/>
+          </a:p>
+        </p:txBody>
+      </p:sp>
+      <p:sp>
+        <p:nvSpPr>
+          <p:cNvPr id="5" name="Rectangle 40"/>
+          <p:cNvSpPr/>
+          <p:nvPr/>
+        </p:nvSpPr>
+        <p:spPr>
+          <a:xfrm>
+            <a:off x="1371601" y="3581400"/>
+            <a:ext cx="1295399" cy="381000"/>
+          </a:xfrm>
+          <a:prstGeom prst="rect">
+            <a:avLst/>
+          </a:prstGeom>
+          <a:solidFill>
+            <a:schemeClr val="accent3"/>
+          </a:solidFill>
+          <a:ln>
+            <a:noFill/>
+          </a:ln>
+        </p:spPr>
+        <p:style>
+          <a:lnRef idx="2">
+            <a:schemeClr val="accent1">
+              <a:shade val="50000"/>
+            </a:schemeClr>
+          </a:lnRef>
+          <a:fillRef idx="1">
+            <a:schemeClr val="accent1"/>
+          </a:fillRef>
+          <a:effectRef idx="0">
+            <a:schemeClr val="accent1"/>
+          </a:effectRef>
+          <a:fontRef idx="minor">
+            <a:schemeClr val="lt1"/>
+          </a:fontRef>
+        </p:style>
+        <p:txBody>
+          <a:bodyPr rtlCol="0" anchor="ctr"/>
+          <a:lstStyle/>
+          <a:p>
+            <a:pPr algn="ctr"/>
+            <a:r>
+              <a:rPr lang="en-US" dirty="0" smtClean="0"/>
+              <a:t>Qualifier</a:t>
+            </a:r>
+            <a:endParaRPr lang="en-SG" dirty="0"/>
+          </a:p>
+        </p:txBody>
+      </p:sp>
+      <p:sp>
+        <p:nvSpPr>
+          <p:cNvPr id="6" name="Rectangle 41"/>
+          <p:cNvSpPr/>
+          <p:nvPr/>
+        </p:nvSpPr>
+        <p:spPr>
+          <a:xfrm>
+            <a:off x="2855383" y="3579657"/>
+            <a:ext cx="1492250" cy="381000"/>
+          </a:xfrm>
+          <a:prstGeom prst="rect">
+            <a:avLst/>
+          </a:prstGeom>
+          <a:solidFill>
+            <a:schemeClr val="accent3"/>
+          </a:solidFill>
+          <a:ln>
+            <a:noFill/>
+          </a:ln>
+        </p:spPr>
+        <p:style>
+          <a:lnRef idx="2">
+            <a:schemeClr val="accent1">
+              <a:shade val="50000"/>
+            </a:schemeClr>
+          </a:lnRef>
+          <a:fillRef idx="1">
+            <a:schemeClr val="accent1"/>
+          </a:fillRef>
+          <a:effectRef idx="0">
+            <a:schemeClr val="accent1"/>
+          </a:effectRef>
+          <a:fontRef idx="minor">
+            <a:schemeClr val="lt1"/>
+          </a:fontRef>
+        </p:style>
+        <p:txBody>
+          <a:bodyPr rtlCol="0" anchor="ctr"/>
+          <a:lstStyle/>
+          <a:p>
+            <a:pPr algn="ctr"/>
+            <a:r>
+              <a:rPr lang="en-US" dirty="0" smtClean="0"/>
+              <a:t>Conjunction</a:t>
+            </a:r>
+            <a:endParaRPr lang="en-SG" dirty="0"/>
+          </a:p>
+        </p:txBody>
+      </p:sp>
+      <p:cxnSp>
+        <p:nvCxnSpPr>
+          <p:cNvPr id="7" name="Elbow Connector 42"/>
+          <p:cNvCxnSpPr>
+            <a:stCxn id="4" idx="2"/>
+            <a:endCxn id="5" idx="0"/>
+          </p:cNvCxnSpPr>
+          <p:nvPr/>
+        </p:nvCxnSpPr>
+        <p:spPr>
+          <a:xfrm rot="5400000">
+            <a:off x="2839062" y="2456840"/>
+            <a:ext cx="304800" cy="1944321"/>
+          </a:xfrm>
+          <a:prstGeom prst="bentConnector3">
+            <a:avLst>
+              <a:gd name="adj1" fmla="val 50000"/>
+            </a:avLst>
+          </a:prstGeom>
+          <a:ln w="19050">
+            <a:solidFill>
+              <a:schemeClr val="accent3"/>
+            </a:solidFill>
+            <a:headEnd type="none" w="med" len="med"/>
+            <a:tailEnd type="triangle" w="med" len="med"/>
+          </a:ln>
+        </p:spPr>
+        <p:style>
+          <a:lnRef idx="1">
+            <a:schemeClr val="accent1"/>
+          </a:lnRef>
+          <a:fillRef idx="0">
+            <a:schemeClr val="accent1"/>
+          </a:fillRef>
+          <a:effectRef idx="0">
+            <a:schemeClr val="accent1"/>
+          </a:effectRef>
+          <a:fontRef idx="minor">
+            <a:schemeClr val="tx1"/>
+          </a:fontRef>
+        </p:style>
+      </p:cxnSp>
+      <p:cxnSp>
+        <p:nvCxnSpPr>
+          <p:cNvPr id="8" name="Elbow Connector 43"/>
+          <p:cNvCxnSpPr>
+            <a:stCxn id="4" idx="2"/>
+            <a:endCxn id="6" idx="0"/>
+          </p:cNvCxnSpPr>
+          <p:nvPr/>
+        </p:nvCxnSpPr>
+        <p:spPr>
+          <a:xfrm rot="5400000">
+            <a:off x="3631037" y="3247071"/>
+            <a:ext cx="303057" cy="362114"/>
+          </a:xfrm>
+          <a:prstGeom prst="bentConnector3">
+            <a:avLst>
+              <a:gd name="adj1" fmla="val 50000"/>
+            </a:avLst>
+          </a:prstGeom>
+          <a:ln w="19050">
+            <a:solidFill>
+              <a:schemeClr val="accent3"/>
+            </a:solidFill>
+            <a:headEnd type="none" w="med" len="med"/>
+            <a:tailEnd type="triangle" w="med" len="med"/>
+          </a:ln>
+        </p:spPr>
+        <p:style>
+          <a:lnRef idx="1">
+            <a:schemeClr val="accent1"/>
+          </a:lnRef>
+          <a:fillRef idx="0">
+            <a:schemeClr val="accent1"/>
+          </a:fillRef>
+          <a:effectRef idx="0">
+            <a:schemeClr val="accent1"/>
+          </a:effectRef>
+          <a:fontRef idx="minor">
+            <a:schemeClr val="tx1"/>
+          </a:fontRef>
+        </p:style>
+      </p:cxnSp>
+      <p:sp>
+        <p:nvSpPr>
+          <p:cNvPr id="19" name="Rectangle 41"/>
+          <p:cNvSpPr/>
+          <p:nvPr/>
+        </p:nvSpPr>
+        <p:spPr>
+          <a:xfrm>
+            <a:off x="4536016" y="3562905"/>
+            <a:ext cx="1371600" cy="381000"/>
+          </a:xfrm>
+          <a:prstGeom prst="rect">
+            <a:avLst/>
+          </a:prstGeom>
+          <a:solidFill>
+            <a:schemeClr val="accent3"/>
+          </a:solidFill>
+          <a:ln>
+            <a:noFill/>
+          </a:ln>
+        </p:spPr>
+        <p:style>
+          <a:lnRef idx="2">
+            <a:schemeClr val="accent1">
+              <a:shade val="50000"/>
+            </a:schemeClr>
+          </a:lnRef>
+          <a:fillRef idx="1">
+            <a:schemeClr val="accent1"/>
+          </a:fillRef>
+          <a:effectRef idx="0">
+            <a:schemeClr val="accent1"/>
+          </a:effectRef>
+          <a:fontRef idx="minor">
+            <a:schemeClr val="lt1"/>
+          </a:fontRef>
+        </p:style>
+        <p:txBody>
+          <a:bodyPr rtlCol="0" anchor="ctr"/>
+          <a:lstStyle/>
+          <a:p>
+            <a:pPr algn="ctr"/>
+            <a:r>
+              <a:rPr lang="en-US" dirty="0" smtClean="0"/>
+              <a:t>Disjunction</a:t>
+            </a:r>
+            <a:endParaRPr lang="en-SG" dirty="0"/>
+          </a:p>
+        </p:txBody>
+      </p:sp>
+      <p:sp>
+        <p:nvSpPr>
+          <p:cNvPr id="20" name="Rectangle 41"/>
+          <p:cNvSpPr/>
+          <p:nvPr/>
+        </p:nvSpPr>
+        <p:spPr>
+          <a:xfrm>
+            <a:off x="6096000" y="3562905"/>
+            <a:ext cx="1271155" cy="381000"/>
+          </a:xfrm>
+          <a:prstGeom prst="rect">
+            <a:avLst/>
+          </a:prstGeom>
+          <a:solidFill>
+            <a:schemeClr val="accent3"/>
+          </a:solidFill>
+          <a:ln>
+            <a:noFill/>
+          </a:ln>
+        </p:spPr>
+        <p:style>
+          <a:lnRef idx="2">
+            <a:schemeClr val="accent1">
+              <a:shade val="50000"/>
+            </a:schemeClr>
+          </a:lnRef>
+          <a:fillRef idx="1">
+            <a:schemeClr val="accent1"/>
+          </a:fillRef>
+          <a:effectRef idx="0">
+            <a:schemeClr val="accent1"/>
+          </a:effectRef>
+          <a:fontRef idx="minor">
+            <a:schemeClr val="lt1"/>
+          </a:fontRef>
+        </p:style>
+        <p:txBody>
+          <a:bodyPr rtlCol="0" anchor="ctr"/>
+          <a:lstStyle/>
+          <a:p>
+            <a:pPr algn="ctr"/>
+            <a:r>
+              <a:rPr lang="en-US" dirty="0" smtClean="0"/>
+              <a:t>Negation</a:t>
+            </a:r>
+            <a:endParaRPr lang="en-SG" dirty="0"/>
+          </a:p>
+        </p:txBody>
+      </p:sp>
+      <p:cxnSp>
+        <p:nvCxnSpPr>
+          <p:cNvPr id="21" name="Elbow Connector 43"/>
+          <p:cNvCxnSpPr>
+            <a:stCxn id="4" idx="2"/>
+            <a:endCxn id="19" idx="0"/>
+          </p:cNvCxnSpPr>
+          <p:nvPr/>
+        </p:nvCxnSpPr>
+        <p:spPr>
+          <a:xfrm rot="16200000" flipH="1">
+            <a:off x="4449567" y="2790655"/>
+            <a:ext cx="286305" cy="1258194"/>
+          </a:xfrm>
+          <a:prstGeom prst="bentConnector3">
+            <a:avLst>
+              <a:gd name="adj1" fmla="val 50000"/>
+            </a:avLst>
+          </a:prstGeom>
+          <a:ln w="19050">
+            <a:solidFill>
+              <a:schemeClr val="accent3"/>
+            </a:solidFill>
+            <a:headEnd type="none" w="med" len="med"/>
+            <a:tailEnd type="triangle" w="med" len="med"/>
+          </a:ln>
+        </p:spPr>
+        <p:style>
+          <a:lnRef idx="1">
+            <a:schemeClr val="accent1"/>
+          </a:lnRef>
+          <a:fillRef idx="0">
+            <a:schemeClr val="accent1"/>
+          </a:fillRef>
+          <a:effectRef idx="0">
+            <a:schemeClr val="accent1"/>
+          </a:effectRef>
+          <a:fontRef idx="minor">
+            <a:schemeClr val="tx1"/>
+          </a:fontRef>
+        </p:style>
+      </p:cxnSp>
+      <p:cxnSp>
+        <p:nvCxnSpPr>
+          <p:cNvPr id="24" name="Elbow Connector 43"/>
+          <p:cNvCxnSpPr>
+            <a:stCxn id="4" idx="2"/>
+            <a:endCxn id="20" idx="0"/>
+          </p:cNvCxnSpPr>
+          <p:nvPr/>
+        </p:nvCxnSpPr>
+        <p:spPr>
+          <a:xfrm rot="16200000" flipH="1">
+            <a:off x="5204448" y="2035774"/>
+            <a:ext cx="286305" cy="2767956"/>
+          </a:xfrm>
+          <a:prstGeom prst="bentConnector3">
+            <a:avLst>
+              <a:gd name="adj1" fmla="val 50000"/>
+            </a:avLst>
+          </a:prstGeom>
+          <a:ln w="19050">
+            <a:solidFill>
+              <a:schemeClr val="accent3"/>
+            </a:solidFill>
+            <a:headEnd type="none" w="med" len="med"/>
+            <a:tailEnd type="triangle" w="med" len="med"/>
+          </a:ln>
+        </p:spPr>
+        <p:style>
+          <a:lnRef idx="1">
+            <a:schemeClr val="accent1"/>
+          </a:lnRef>
+          <a:fillRef idx="0">
+            <a:schemeClr val="accent1"/>
+          </a:fillRef>
+          <a:effectRef idx="0">
+            <a:schemeClr val="accent1"/>
+          </a:effectRef>
+          <a:fontRef idx="minor">
+            <a:schemeClr val="tx1"/>
+          </a:fontRef>
+        </p:style>
+      </p:cxnSp>
+    </p:spTree>
+    <p:extLst>
+      <p:ext uri="{BB962C8B-B14F-4D97-AF65-F5344CB8AC3E}">
+        <p14:creationId xmlns:p14="http://schemas.microsoft.com/office/powerpoint/2010/main" val="1323673547"/>
+      </p:ext>
+    </p:extLst>
+  </p:cSld>
+  <p:clrMapOvr>
+    <a:masterClrMapping/>
+  </p:clrMapOvr>
+</p:sld>
+</file>
+
+<file path=ppt/slides/slide4.xml><?xml version="1.0" encoding="utf-8"?>
+<p:sld xmlns:a="http://schemas.openxmlformats.org/drawingml/2006/main" xmlns:r="http://schemas.openxmlformats.org/officeDocument/2006/relationships" xmlns:p="http://schemas.openxmlformats.org/presentationml/2006/main">
+  <p:cSld>
+    <p:spTree>
+      <p:nvGrpSpPr>
+        <p:cNvPr id="1" name=""/>
+        <p:cNvGrpSpPr/>
+        <p:nvPr/>
+      </p:nvGrpSpPr>
+      <p:grpSpPr>
+        <a:xfrm>
+          <a:off x="0" y="0"/>
+          <a:ext cx="0" cy="0"/>
+          <a:chOff x="0" y="0"/>
+          <a:chExt cx="0" cy="0"/>
+        </a:xfrm>
+      </p:grpSpPr>
+      <p:sp>
+        <p:nvSpPr>
+          <p:cNvPr id="4" name="AutoShape 2" descr="C:\HubTurbo\docs\images\design\viewsAndControllers.png?raw=true">
+            <a:hlinkClick r:id="rId2"/>
+          </p:cNvPr>
+          <p:cNvSpPr>
+            <a:spLocks noChangeAspect="1" noChangeArrowheads="1"/>
+          </p:cNvSpPr>
+          <p:nvPr/>
+        </p:nvSpPr>
+        <p:spPr bwMode="auto">
+          <a:xfrm>
+            <a:off x="8777288" y="-144463"/>
+            <a:ext cx="304800" cy="304801"/>
+          </a:xfrm>
+          <a:prstGeom prst="rect">
+            <a:avLst/>
+          </a:prstGeom>
+          <a:noFill/>
+          <a:extLst>
+            <a:ext uri="{909E8E84-426E-40DD-AFC4-6F175D3DCCD1}">
+              <a14:hiddenFill xmlns:a14="http://schemas.microsoft.com/office/drawing/2010/main">
+                <a:solidFill>
+                  <a:srgbClr val="FFFFFF"/>
+                </a:solidFill>
+              </a14:hiddenFill>
+            </a:ext>
+          </a:extLst>
+        </p:spPr>
+        <p:txBody>
+          <a:bodyPr vert="horz" wrap="square" lIns="91440" tIns="45720" rIns="91440" bIns="45720" numCol="1" anchor="t" anchorCtr="0" compatLnSpc="1">
+            <a:prstTxWarp prst="textNoShape">
+              <a:avLst/>
+            </a:prstTxWarp>
+          </a:bodyPr>
+          <a:lstStyle/>
+          <a:p>
+            <a:endParaRPr lang="en-SG"/>
+          </a:p>
+        </p:txBody>
+      </p:sp>
+      <p:sp>
+        <p:nvSpPr>
+          <p:cNvPr id="6" name="Rectangle 47"/>
+          <p:cNvSpPr/>
+          <p:nvPr/>
+        </p:nvSpPr>
+        <p:spPr>
+          <a:xfrm>
+            <a:off x="2209800" y="864367"/>
+            <a:ext cx="4267201" cy="2336033"/>
+          </a:xfrm>
+          <a:prstGeom prst="rect">
+            <a:avLst/>
+          </a:prstGeom>
+          <a:solidFill>
+            <a:schemeClr val="accent2">
+              <a:lumMod val="20000"/>
+              <a:lumOff val="80000"/>
+            </a:schemeClr>
+          </a:solidFill>
+          <a:ln>
+            <a:noFill/>
+          </a:ln>
+        </p:spPr>
+        <p:style>
+          <a:lnRef idx="2">
+            <a:schemeClr val="accent1">
+              <a:shade val="50000"/>
+            </a:schemeClr>
+          </a:lnRef>
+          <a:fillRef idx="1">
+            <a:schemeClr val="accent1"/>
+          </a:fillRef>
+          <a:effectRef idx="0">
+            <a:schemeClr val="accent1"/>
+          </a:effectRef>
+          <a:fontRef idx="minor">
+            <a:schemeClr val="lt1"/>
+          </a:fontRef>
+        </p:style>
+        <p:txBody>
+          <a:bodyPr rtlCol="0" anchor="t"/>
+          <a:lstStyle/>
+          <a:p>
+            <a:r>
+              <a:rPr lang="en-US" b="1" dirty="0" smtClean="0"/>
+              <a:t>Backend</a:t>
+            </a:r>
+            <a:endParaRPr lang="en-SG" b="1" dirty="0"/>
+          </a:p>
+        </p:txBody>
+      </p:sp>
+      <p:sp>
+        <p:nvSpPr>
+          <p:cNvPr id="9" name="Rectangle 3"/>
+          <p:cNvSpPr/>
+          <p:nvPr/>
+        </p:nvSpPr>
+        <p:spPr>
+          <a:xfrm>
+            <a:off x="2701926" y="1447800"/>
+            <a:ext cx="838200" cy="381000"/>
+          </a:xfrm>
+          <a:prstGeom prst="rect">
+            <a:avLst/>
+          </a:prstGeom>
+          <a:solidFill>
+            <a:schemeClr val="accent2"/>
+          </a:solidFill>
+          <a:ln>
+            <a:noFill/>
+          </a:ln>
+        </p:spPr>
+        <p:style>
+          <a:lnRef idx="2">
+            <a:schemeClr val="accent1">
+              <a:shade val="50000"/>
+            </a:schemeClr>
+          </a:lnRef>
+          <a:fillRef idx="1">
+            <a:schemeClr val="accent1"/>
+          </a:fillRef>
+          <a:effectRef idx="0">
+            <a:schemeClr val="accent1"/>
+          </a:effectRef>
+          <a:fontRef idx="minor">
+            <a:schemeClr val="lt1"/>
+          </a:fontRef>
+        </p:style>
+        <p:txBody>
+          <a:bodyPr rtlCol="0" anchor="ctr"/>
+          <a:lstStyle/>
+          <a:p>
+            <a:pPr algn="ctr"/>
+            <a:r>
+              <a:rPr lang="en-US" dirty="0" smtClean="0"/>
+              <a:t>Logic</a:t>
+            </a:r>
+            <a:endParaRPr lang="en-SG" dirty="0"/>
+          </a:p>
+        </p:txBody>
+      </p:sp>
+      <p:sp>
+        <p:nvSpPr>
+          <p:cNvPr id="11" name="Rectangle 7"/>
+          <p:cNvSpPr/>
+          <p:nvPr/>
+        </p:nvSpPr>
+        <p:spPr>
+          <a:xfrm>
+            <a:off x="2362200" y="2514600"/>
+            <a:ext cx="1523999" cy="381000"/>
+          </a:xfrm>
+          <a:prstGeom prst="rect">
+            <a:avLst/>
+          </a:prstGeom>
+          <a:solidFill>
+            <a:schemeClr val="accent2"/>
+          </a:solidFill>
+          <a:ln>
+            <a:noFill/>
+          </a:ln>
+        </p:spPr>
+        <p:style>
+          <a:lnRef idx="2">
+            <a:schemeClr val="accent1">
+              <a:shade val="50000"/>
+            </a:schemeClr>
+          </a:lnRef>
+          <a:fillRef idx="1">
+            <a:schemeClr val="accent1"/>
+          </a:fillRef>
+          <a:effectRef idx="0">
+            <a:schemeClr val="accent1"/>
+          </a:effectRef>
+          <a:fontRef idx="minor">
+            <a:schemeClr val="lt1"/>
+          </a:fontRef>
+        </p:style>
+        <p:txBody>
+          <a:bodyPr rtlCol="0" anchor="ctr"/>
+          <a:lstStyle/>
+          <a:p>
+            <a:pPr algn="ctr"/>
+            <a:r>
+              <a:rPr lang="en-US" dirty="0" err="1" smtClean="0"/>
+              <a:t>UiManager</a:t>
+            </a:r>
+            <a:endParaRPr lang="en-SG" dirty="0"/>
+          </a:p>
+        </p:txBody>
+      </p:sp>
+      <p:cxnSp>
+        <p:nvCxnSpPr>
+          <p:cNvPr id="13" name="Elbow Connector 13"/>
+          <p:cNvCxnSpPr>
+            <a:stCxn id="9" idx="2"/>
+            <a:endCxn id="11" idx="0"/>
+          </p:cNvCxnSpPr>
+          <p:nvPr/>
+        </p:nvCxnSpPr>
+        <p:spPr>
+          <a:xfrm rot="16200000" flipH="1">
+            <a:off x="2779713" y="2170113"/>
+            <a:ext cx="685800" cy="3174"/>
+          </a:xfrm>
+          <a:prstGeom prst="bentConnector3">
+            <a:avLst>
+              <a:gd name="adj1" fmla="val 50000"/>
+            </a:avLst>
+          </a:prstGeom>
+          <a:ln w="19050">
+            <a:solidFill>
+              <a:schemeClr val="accent2"/>
+            </a:solidFill>
+            <a:headEnd type="none" w="med" len="med"/>
+            <a:tailEnd type="triangle" w="med" len="med"/>
+          </a:ln>
+        </p:spPr>
+        <p:style>
+          <a:lnRef idx="1">
+            <a:schemeClr val="accent1"/>
+          </a:lnRef>
+          <a:fillRef idx="0">
+            <a:schemeClr val="accent1"/>
+          </a:fillRef>
+          <a:effectRef idx="0">
+            <a:schemeClr val="accent1"/>
+          </a:effectRef>
+          <a:fontRef idx="minor">
+            <a:schemeClr val="tx1"/>
+          </a:fontRef>
+        </p:style>
+      </p:cxnSp>
+      <p:sp>
+        <p:nvSpPr>
+          <p:cNvPr id="15" name="Rectangle 21"/>
+          <p:cNvSpPr/>
+          <p:nvPr/>
+        </p:nvSpPr>
+        <p:spPr>
+          <a:xfrm>
+            <a:off x="4968876" y="1447799"/>
+            <a:ext cx="1355724" cy="381000"/>
+          </a:xfrm>
+          <a:prstGeom prst="rect">
+            <a:avLst/>
+          </a:prstGeom>
+          <a:solidFill>
+            <a:schemeClr val="accent2"/>
+          </a:solidFill>
+          <a:ln>
+            <a:noFill/>
+          </a:ln>
+        </p:spPr>
+        <p:style>
+          <a:lnRef idx="2">
+            <a:schemeClr val="accent1">
+              <a:shade val="50000"/>
+            </a:schemeClr>
+          </a:lnRef>
+          <a:fillRef idx="1">
+            <a:schemeClr val="accent1"/>
+          </a:fillRef>
+          <a:effectRef idx="0">
+            <a:schemeClr val="accent1"/>
+          </a:effectRef>
+          <a:fontRef idx="minor">
+            <a:schemeClr val="lt1"/>
+          </a:fontRef>
+        </p:style>
+        <p:txBody>
+          <a:bodyPr rtlCol="0" anchor="ctr"/>
+          <a:lstStyle/>
+          <a:p>
+            <a:pPr algn="ctr"/>
+            <a:r>
+              <a:rPr lang="en-US" dirty="0" err="1"/>
+              <a:t>RepoSource</a:t>
+            </a:r>
+            <a:endParaRPr lang="en-SG" dirty="0"/>
+          </a:p>
+        </p:txBody>
+      </p:sp>
+      <p:sp>
+        <p:nvSpPr>
+          <p:cNvPr id="27" name="Rectangle 47"/>
+          <p:cNvSpPr/>
+          <p:nvPr/>
+        </p:nvSpPr>
+        <p:spPr>
+          <a:xfrm>
+            <a:off x="1238468" y="864367"/>
+            <a:ext cx="568326" cy="2336033"/>
+          </a:xfrm>
+          <a:prstGeom prst="rect">
+            <a:avLst/>
+          </a:prstGeom>
+          <a:solidFill>
+            <a:schemeClr val="accent4">
+              <a:lumMod val="20000"/>
+              <a:lumOff val="80000"/>
+            </a:schemeClr>
+          </a:solidFill>
+          <a:ln>
+            <a:noFill/>
+          </a:ln>
+        </p:spPr>
+        <p:style>
+          <a:lnRef idx="2">
+            <a:schemeClr val="accent1">
+              <a:shade val="50000"/>
+            </a:schemeClr>
+          </a:lnRef>
+          <a:fillRef idx="1">
+            <a:schemeClr val="accent1"/>
+          </a:fillRef>
+          <a:effectRef idx="0">
+            <a:schemeClr val="accent1"/>
+          </a:effectRef>
+          <a:fontRef idx="minor">
+            <a:schemeClr val="lt1"/>
+          </a:fontRef>
+        </p:style>
+        <p:txBody>
+          <a:bodyPr rtlCol="0" anchor="t"/>
+          <a:lstStyle/>
+          <a:p>
+            <a:r>
+              <a:rPr lang="en-US" b="1" dirty="0" smtClean="0"/>
+              <a:t>UI</a:t>
+            </a:r>
+            <a:endParaRPr lang="en-SG" b="1" dirty="0"/>
+          </a:p>
+        </p:txBody>
+      </p:sp>
+      <p:cxnSp>
+        <p:nvCxnSpPr>
+          <p:cNvPr id="31" name="Straight Arrow Connector 30"/>
+          <p:cNvCxnSpPr/>
+          <p:nvPr/>
+        </p:nvCxnSpPr>
+        <p:spPr>
+          <a:xfrm>
+            <a:off x="1806794" y="1676400"/>
+            <a:ext cx="895132" cy="0"/>
+          </a:xfrm>
+          <a:prstGeom prst="straightConnector1">
+            <a:avLst/>
+          </a:prstGeom>
+          <a:ln w="19050">
+            <a:solidFill>
+              <a:srgbClr val="7030A0"/>
+            </a:solidFill>
+            <a:headEnd type="none" w="med" len="med"/>
+            <a:tailEnd type="triangle" w="med" len="med"/>
+          </a:ln>
+        </p:spPr>
+        <p:style>
+          <a:lnRef idx="1">
+            <a:schemeClr val="accent1"/>
+          </a:lnRef>
+          <a:fillRef idx="0">
+            <a:schemeClr val="accent1"/>
+          </a:fillRef>
+          <a:effectRef idx="0">
+            <a:schemeClr val="accent1"/>
+          </a:effectRef>
+          <a:fontRef idx="minor">
+            <a:schemeClr val="tx1"/>
+          </a:fontRef>
+        </p:style>
+      </p:cxnSp>
+      <p:cxnSp>
+        <p:nvCxnSpPr>
+          <p:cNvPr id="33" name="Straight Arrow Connector 32"/>
+          <p:cNvCxnSpPr>
+            <a:stCxn id="11" idx="1"/>
+          </p:cNvCxnSpPr>
+          <p:nvPr/>
+        </p:nvCxnSpPr>
+        <p:spPr>
+          <a:xfrm flipH="1">
+            <a:off x="1806794" y="2705100"/>
+            <a:ext cx="555406" cy="0"/>
+          </a:xfrm>
+          <a:prstGeom prst="straightConnector1">
+            <a:avLst/>
+          </a:prstGeom>
+          <a:ln w="19050">
+            <a:solidFill>
+              <a:schemeClr val="accent2"/>
+            </a:solidFill>
+            <a:headEnd type="none" w="med" len="med"/>
+            <a:tailEnd type="triangle" w="med" len="med"/>
+          </a:ln>
+        </p:spPr>
+        <p:style>
+          <a:lnRef idx="1">
+            <a:schemeClr val="accent1"/>
+          </a:lnRef>
+          <a:fillRef idx="0">
+            <a:schemeClr val="accent1"/>
+          </a:fillRef>
+          <a:effectRef idx="0">
+            <a:schemeClr val="accent1"/>
+          </a:effectRef>
+          <a:fontRef idx="minor">
+            <a:schemeClr val="tx1"/>
+          </a:fontRef>
+        </p:style>
+      </p:cxnSp>
+      <p:sp>
+        <p:nvSpPr>
+          <p:cNvPr id="44" name="Rectangle 21"/>
+          <p:cNvSpPr/>
+          <p:nvPr/>
+        </p:nvSpPr>
+        <p:spPr>
+          <a:xfrm>
+            <a:off x="4968876" y="2438400"/>
+            <a:ext cx="1355724" cy="381000"/>
+          </a:xfrm>
+          <a:prstGeom prst="rect">
+            <a:avLst/>
+          </a:prstGeom>
+          <a:solidFill>
+            <a:schemeClr val="accent2"/>
+          </a:solidFill>
+          <a:ln>
+            <a:noFill/>
+          </a:ln>
+        </p:spPr>
+        <p:style>
+          <a:lnRef idx="2">
+            <a:schemeClr val="accent1">
+              <a:shade val="50000"/>
+            </a:schemeClr>
+          </a:lnRef>
+          <a:fillRef idx="1">
+            <a:schemeClr val="accent1"/>
+          </a:fillRef>
+          <a:effectRef idx="0">
+            <a:schemeClr val="accent1"/>
+          </a:effectRef>
+          <a:fontRef idx="minor">
+            <a:schemeClr val="lt1"/>
+          </a:fontRef>
+        </p:style>
+        <p:txBody>
+          <a:bodyPr rtlCol="0" anchor="ctr"/>
+          <a:lstStyle/>
+          <a:p>
+            <a:pPr algn="ctr"/>
+            <a:r>
+              <a:rPr lang="en-US" dirty="0" err="1" smtClean="0"/>
+              <a:t>RepoStore</a:t>
+            </a:r>
+            <a:endParaRPr lang="en-SG" dirty="0"/>
+          </a:p>
+        </p:txBody>
+      </p:sp>
+      <p:sp>
+        <p:nvSpPr>
+          <p:cNvPr id="45" name="Rectangle 47"/>
+          <p:cNvSpPr/>
+          <p:nvPr/>
+        </p:nvSpPr>
+        <p:spPr>
+          <a:xfrm>
+            <a:off x="7010400" y="864367"/>
+            <a:ext cx="685800" cy="1181677"/>
+          </a:xfrm>
+          <a:prstGeom prst="rect">
+            <a:avLst/>
+          </a:prstGeom>
+          <a:solidFill>
+            <a:schemeClr val="accent5">
+              <a:lumMod val="40000"/>
+              <a:lumOff val="60000"/>
+            </a:schemeClr>
+          </a:solidFill>
+          <a:ln>
+            <a:noFill/>
+          </a:ln>
+        </p:spPr>
+        <p:style>
+          <a:lnRef idx="2">
+            <a:schemeClr val="accent1">
+              <a:shade val="50000"/>
+            </a:schemeClr>
+          </a:lnRef>
+          <a:fillRef idx="1">
+            <a:schemeClr val="accent1"/>
+          </a:fillRef>
+          <a:effectRef idx="0">
+            <a:schemeClr val="accent1"/>
+          </a:effectRef>
+          <a:fontRef idx="minor">
+            <a:schemeClr val="lt1"/>
+          </a:fontRef>
+        </p:style>
+        <p:txBody>
+          <a:bodyPr vert="vert270" rtlCol="0" anchor="t"/>
+          <a:lstStyle/>
+          <a:p>
+            <a:pPr algn="ctr"/>
+            <a:r>
+              <a:rPr lang="en-US" b="1" dirty="0" err="1" smtClean="0"/>
+              <a:t>Github</a:t>
+            </a:r>
+            <a:endParaRPr lang="en-SG" b="1" dirty="0"/>
+          </a:p>
+        </p:txBody>
+      </p:sp>
+      <p:cxnSp>
+        <p:nvCxnSpPr>
+          <p:cNvPr id="46" name="Straight Arrow Connector 45"/>
+          <p:cNvCxnSpPr>
+            <a:stCxn id="15" idx="3"/>
+          </p:cNvCxnSpPr>
+          <p:nvPr/>
+        </p:nvCxnSpPr>
+        <p:spPr>
+          <a:xfrm>
+            <a:off x="6324600" y="1638299"/>
+            <a:ext cx="685800" cy="0"/>
+          </a:xfrm>
+          <a:prstGeom prst="straightConnector1">
+            <a:avLst/>
+          </a:prstGeom>
+          <a:ln w="19050">
+            <a:solidFill>
+              <a:schemeClr val="accent2"/>
+            </a:solidFill>
+            <a:headEnd type="none" w="med" len="med"/>
+            <a:tailEnd type="triangle" w="med" len="med"/>
+          </a:ln>
+        </p:spPr>
+        <p:style>
+          <a:lnRef idx="1">
+            <a:schemeClr val="accent1"/>
+          </a:lnRef>
+          <a:fillRef idx="0">
+            <a:schemeClr val="accent1"/>
+          </a:fillRef>
+          <a:effectRef idx="0">
+            <a:schemeClr val="accent1"/>
+          </a:effectRef>
+          <a:fontRef idx="minor">
+            <a:schemeClr val="tx1"/>
+          </a:fontRef>
+        </p:style>
+      </p:cxnSp>
+      <p:sp>
+        <p:nvSpPr>
+          <p:cNvPr id="49" name="Flowchart: Magnetic Disk 11"/>
+          <p:cNvSpPr/>
+          <p:nvPr/>
+        </p:nvSpPr>
+        <p:spPr>
+          <a:xfrm>
+            <a:off x="6858000" y="2251745"/>
+            <a:ext cx="990600" cy="762000"/>
+          </a:xfrm>
+          <a:prstGeom prst="flowChartMagneticDisk">
+            <a:avLst/>
+          </a:prstGeom>
+          <a:solidFill>
+            <a:schemeClr val="bg1">
+              <a:lumMod val="75000"/>
+            </a:schemeClr>
+          </a:solidFill>
+          <a:ln w="12700">
+            <a:solidFill>
+              <a:schemeClr val="bg1"/>
+            </a:solidFill>
+          </a:ln>
+        </p:spPr>
+        <p:style>
+          <a:lnRef idx="2">
+            <a:schemeClr val="accent1">
+              <a:shade val="50000"/>
+            </a:schemeClr>
+          </a:lnRef>
+          <a:fillRef idx="1">
+            <a:schemeClr val="accent1"/>
+          </a:fillRef>
+          <a:effectRef idx="0">
+            <a:schemeClr val="accent1"/>
+          </a:effectRef>
+          <a:fontRef idx="minor">
+            <a:schemeClr val="lt1"/>
+          </a:fontRef>
+        </p:style>
+        <p:txBody>
+          <a:bodyPr rtlCol="0" anchor="ctr"/>
+          <a:lstStyle/>
+          <a:p>
+            <a:pPr algn="ctr"/>
+            <a:r>
+              <a:rPr lang="en-US" dirty="0" smtClean="0"/>
+              <a:t>Cache</a:t>
+            </a:r>
+            <a:endParaRPr lang="en-SG" dirty="0"/>
+          </a:p>
+        </p:txBody>
+      </p:sp>
+      <p:cxnSp>
+        <p:nvCxnSpPr>
+          <p:cNvPr id="50" name="Straight Arrow Connector 49"/>
+          <p:cNvCxnSpPr/>
+          <p:nvPr/>
+        </p:nvCxnSpPr>
+        <p:spPr>
+          <a:xfrm>
+            <a:off x="6324600" y="2628900"/>
+            <a:ext cx="533400" cy="0"/>
+          </a:xfrm>
+          <a:prstGeom prst="straightConnector1">
+            <a:avLst/>
+          </a:prstGeom>
+          <a:ln w="19050">
+            <a:solidFill>
+              <a:schemeClr val="accent2"/>
+            </a:solidFill>
+            <a:headEnd type="none" w="med" len="med"/>
+            <a:tailEnd type="triangle" w="med" len="med"/>
+          </a:ln>
+        </p:spPr>
+        <p:style>
+          <a:lnRef idx="1">
+            <a:schemeClr val="accent1"/>
+          </a:lnRef>
+          <a:fillRef idx="0">
+            <a:schemeClr val="accent1"/>
+          </a:fillRef>
+          <a:effectRef idx="0">
+            <a:schemeClr val="accent1"/>
+          </a:effectRef>
+          <a:fontRef idx="minor">
+            <a:schemeClr val="tx1"/>
+          </a:fontRef>
+        </p:style>
+      </p:cxnSp>
+      <p:sp>
+        <p:nvSpPr>
+          <p:cNvPr id="62" name="Rectangle 21"/>
+          <p:cNvSpPr/>
+          <p:nvPr/>
+        </p:nvSpPr>
+        <p:spPr>
+          <a:xfrm>
+            <a:off x="4191000" y="1943479"/>
+            <a:ext cx="936768" cy="381000"/>
+          </a:xfrm>
+          <a:prstGeom prst="rect">
+            <a:avLst/>
+          </a:prstGeom>
+          <a:solidFill>
+            <a:schemeClr val="accent2"/>
+          </a:solidFill>
+          <a:ln>
+            <a:noFill/>
+          </a:ln>
+        </p:spPr>
+        <p:style>
+          <a:lnRef idx="2">
+            <a:schemeClr val="accent1">
+              <a:shade val="50000"/>
+            </a:schemeClr>
+          </a:lnRef>
+          <a:fillRef idx="1">
+            <a:schemeClr val="accent1"/>
+          </a:fillRef>
+          <a:effectRef idx="0">
+            <a:schemeClr val="accent1"/>
+          </a:effectRef>
+          <a:fontRef idx="minor">
+            <a:schemeClr val="lt1"/>
+          </a:fontRef>
+        </p:style>
+        <p:txBody>
+          <a:bodyPr rtlCol="0" anchor="ctr"/>
+          <a:lstStyle/>
+          <a:p>
+            <a:pPr algn="ctr"/>
+            <a:r>
+              <a:rPr lang="en-US" dirty="0" err="1" smtClean="0"/>
+              <a:t>RepoIO</a:t>
+            </a:r>
+            <a:endParaRPr lang="en-SG" dirty="0"/>
+          </a:p>
+        </p:txBody>
+      </p:sp>
+      <p:cxnSp>
+        <p:nvCxnSpPr>
+          <p:cNvPr id="63" name="Elbow Connector 13"/>
+          <p:cNvCxnSpPr>
+            <a:stCxn id="62" idx="0"/>
+            <a:endCxn id="15" idx="1"/>
+          </p:cNvCxnSpPr>
+          <p:nvPr/>
+        </p:nvCxnSpPr>
+        <p:spPr>
+          <a:xfrm rot="5400000" flipH="1" flipV="1">
+            <a:off x="4661540" y="1636143"/>
+            <a:ext cx="305180" cy="309492"/>
+          </a:xfrm>
+          <a:prstGeom prst="bentConnector2">
+            <a:avLst/>
+          </a:prstGeom>
+          <a:ln w="19050">
+            <a:solidFill>
+              <a:schemeClr val="accent2"/>
+            </a:solidFill>
+            <a:headEnd type="none" w="med" len="med"/>
+            <a:tailEnd type="triangle" w="med" len="med"/>
+          </a:ln>
+        </p:spPr>
+        <p:style>
+          <a:lnRef idx="1">
+            <a:schemeClr val="accent1"/>
+          </a:lnRef>
+          <a:fillRef idx="0">
+            <a:schemeClr val="accent1"/>
+          </a:fillRef>
+          <a:effectRef idx="0">
+            <a:schemeClr val="accent1"/>
+          </a:effectRef>
+          <a:fontRef idx="minor">
+            <a:schemeClr val="tx1"/>
+          </a:fontRef>
+        </p:style>
+      </p:cxnSp>
+      <p:cxnSp>
+        <p:nvCxnSpPr>
+          <p:cNvPr id="66" name="Elbow Connector 13"/>
+          <p:cNvCxnSpPr>
+            <a:stCxn id="62" idx="2"/>
+            <a:endCxn id="44" idx="1"/>
+          </p:cNvCxnSpPr>
+          <p:nvPr/>
+        </p:nvCxnSpPr>
+        <p:spPr>
+          <a:xfrm rot="16200000" flipH="1">
+            <a:off x="4661920" y="2321943"/>
+            <a:ext cx="304421" cy="309492"/>
+          </a:xfrm>
+          <a:prstGeom prst="bentConnector2">
+            <a:avLst/>
+          </a:prstGeom>
+          <a:ln w="19050">
+            <a:solidFill>
+              <a:schemeClr val="accent2"/>
+            </a:solidFill>
+            <a:headEnd type="none" w="med" len="med"/>
+            <a:tailEnd type="triangle" w="med" len="med"/>
+          </a:ln>
+        </p:spPr>
+        <p:style>
+          <a:lnRef idx="1">
+            <a:schemeClr val="accent1"/>
+          </a:lnRef>
+          <a:fillRef idx="0">
+            <a:schemeClr val="accent1"/>
+          </a:fillRef>
+          <a:effectRef idx="0">
+            <a:schemeClr val="accent1"/>
+          </a:effectRef>
+          <a:fontRef idx="minor">
+            <a:schemeClr val="tx1"/>
+          </a:fontRef>
+        </p:style>
+      </p:cxnSp>
+      <p:sp>
+        <p:nvSpPr>
+          <p:cNvPr id="1028" name="Freeform 1027"/>
+          <p:cNvSpPr/>
+          <p:nvPr/>
+        </p:nvSpPr>
+        <p:spPr>
+          <a:xfrm>
+            <a:off x="3740727" y="831273"/>
+            <a:ext cx="434109" cy="2410691"/>
+          </a:xfrm>
+          <a:custGeom>
+            <a:avLst/>
+            <a:gdLst>
+              <a:gd name="connsiteX0" fmla="*/ 64655 w 434109"/>
+              <a:gd name="connsiteY0" fmla="*/ 0 h 2410691"/>
+              <a:gd name="connsiteX1" fmla="*/ 230909 w 434109"/>
+              <a:gd name="connsiteY1" fmla="*/ 350982 h 2410691"/>
+              <a:gd name="connsiteX2" fmla="*/ 0 w 434109"/>
+              <a:gd name="connsiteY2" fmla="*/ 628072 h 2410691"/>
+              <a:gd name="connsiteX3" fmla="*/ 230909 w 434109"/>
+              <a:gd name="connsiteY3" fmla="*/ 1052945 h 2410691"/>
+              <a:gd name="connsiteX4" fmla="*/ 0 w 434109"/>
+              <a:gd name="connsiteY4" fmla="*/ 1339272 h 2410691"/>
+              <a:gd name="connsiteX5" fmla="*/ 434109 w 434109"/>
+              <a:gd name="connsiteY5" fmla="*/ 1874982 h 2410691"/>
+              <a:gd name="connsiteX6" fmla="*/ 267855 w 434109"/>
+              <a:gd name="connsiteY6" fmla="*/ 2216727 h 2410691"/>
+              <a:gd name="connsiteX7" fmla="*/ 378691 w 434109"/>
+              <a:gd name="connsiteY7" fmla="*/ 2410691 h 2410691"/>
+            </a:gdLst>
+            <a:ahLst/>
+            <a:cxnLst>
+              <a:cxn ang="0">
+                <a:pos x="connsiteX0" y="connsiteY0"/>
+              </a:cxn>
+              <a:cxn ang="0">
+                <a:pos x="connsiteX1" y="connsiteY1"/>
+              </a:cxn>
+              <a:cxn ang="0">
+                <a:pos x="connsiteX2" y="connsiteY2"/>
+              </a:cxn>
+              <a:cxn ang="0">
+                <a:pos x="connsiteX3" y="connsiteY3"/>
+              </a:cxn>
+              <a:cxn ang="0">
+                <a:pos x="connsiteX4" y="connsiteY4"/>
+              </a:cxn>
+              <a:cxn ang="0">
+                <a:pos x="connsiteX5" y="connsiteY5"/>
+              </a:cxn>
+              <a:cxn ang="0">
+                <a:pos x="connsiteX6" y="connsiteY6"/>
+              </a:cxn>
+              <a:cxn ang="0">
+                <a:pos x="connsiteX7" y="connsiteY7"/>
+              </a:cxn>
+            </a:cxnLst>
+            <a:rect l="l" t="t" r="r" b="b"/>
+            <a:pathLst>
+              <a:path w="434109" h="2410691">
+                <a:moveTo>
+                  <a:pt x="64655" y="0"/>
+                </a:moveTo>
+                <a:lnTo>
+                  <a:pt x="230909" y="350982"/>
+                </a:lnTo>
+                <a:lnTo>
+                  <a:pt x="0" y="628072"/>
+                </a:lnTo>
+                <a:lnTo>
+                  <a:pt x="230909" y="1052945"/>
+                </a:lnTo>
+                <a:lnTo>
+                  <a:pt x="0" y="1339272"/>
+                </a:lnTo>
+                <a:lnTo>
+                  <a:pt x="434109" y="1874982"/>
+                </a:lnTo>
+                <a:lnTo>
+                  <a:pt x="267855" y="2216727"/>
+                </a:lnTo>
+                <a:lnTo>
+                  <a:pt x="378691" y="2410691"/>
+                </a:lnTo>
+              </a:path>
+            </a:pathLst>
+          </a:custGeom>
+          <a:noFill/>
+          <a:ln>
+            <a:solidFill>
+              <a:schemeClr val="bg1"/>
+            </a:solidFill>
+          </a:ln>
+        </p:spPr>
+        <p:style>
+          <a:lnRef idx="2">
+            <a:schemeClr val="accent1">
+              <a:shade val="50000"/>
+            </a:schemeClr>
+          </a:lnRef>
+          <a:fillRef idx="1">
+            <a:schemeClr val="accent1"/>
+          </a:fillRef>
+          <a:effectRef idx="0">
+            <a:schemeClr val="accent1"/>
+          </a:effectRef>
+          <a:fontRef idx="minor">
+            <a:schemeClr val="lt1"/>
+          </a:fontRef>
+        </p:style>
+        <p:txBody>
+          <a:bodyPr rtlCol="0" anchor="ctr"/>
+          <a:lstStyle/>
+          <a:p>
+            <a:pPr algn="ctr"/>
+            <a:endParaRPr lang="en-SG"/>
+          </a:p>
+        </p:txBody>
+      </p:sp>
+    </p:spTree>
+    <p:extLst>
+      <p:ext uri="{BB962C8B-B14F-4D97-AF65-F5344CB8AC3E}">
+        <p14:creationId xmlns:p14="http://schemas.microsoft.com/office/powerpoint/2010/main" val="4156486103"/>
       </p:ext>
     </p:extLst>
   </p:cSld>

</xml_diff>

<commit_message>
Update design document to include updater
</commit_message>
<xml_diff>
--- a/docs/images/design/design.pptx
+++ b/docs/images/design/design.pptx
@@ -107,6 +107,22 @@
       </a:defRPr>
     </a:lvl9pPr>
   </p:defaultTextStyle>
+  <p:extLst>
+    <p:ext uri="{EFAFB233-063F-42B5-8137-9DF3F51BA10A}">
+      <p15:sldGuideLst xmlns:p15="http://schemas.microsoft.com/office/powerpoint/2012/main">
+        <p15:guide id="1" orient="horz" pos="2160">
+          <p15:clr>
+            <a:srgbClr val="A4A3A4"/>
+          </p15:clr>
+        </p15:guide>
+        <p15:guide id="2" pos="2880">
+          <p15:clr>
+            <a:srgbClr val="A4A3A4"/>
+          </p15:clr>
+        </p15:guide>
+      </p15:sldGuideLst>
+    </p:ext>
+  </p:extLst>
 </p:presentation>
 </file>
 
@@ -292,7 +308,7 @@
             <a:fld id="{1D8BD707-D9CF-40AE-B4C6-C98DA3205C09}" type="datetimeFigureOut">
               <a:rPr lang="en-US" smtClean="0"/>
               <a:pPr/>
-              <a:t>7/27/2015</a:t>
+              <a:t>3/30/2016</a:t>
             </a:fld>
             <a:endParaRPr lang="en-US"/>
           </a:p>
@@ -459,7 +475,7 @@
             <a:fld id="{1D8BD707-D9CF-40AE-B4C6-C98DA3205C09}" type="datetimeFigureOut">
               <a:rPr lang="en-US" smtClean="0"/>
               <a:pPr/>
-              <a:t>7/27/2015</a:t>
+              <a:t>3/30/2016</a:t>
             </a:fld>
             <a:endParaRPr lang="en-US"/>
           </a:p>
@@ -636,7 +652,7 @@
             <a:fld id="{1D8BD707-D9CF-40AE-B4C6-C98DA3205C09}" type="datetimeFigureOut">
               <a:rPr lang="en-US" smtClean="0"/>
               <a:pPr/>
-              <a:t>7/27/2015</a:t>
+              <a:t>3/30/2016</a:t>
             </a:fld>
             <a:endParaRPr lang="en-US"/>
           </a:p>
@@ -803,7 +819,7 @@
             <a:fld id="{1D8BD707-D9CF-40AE-B4C6-C98DA3205C09}" type="datetimeFigureOut">
               <a:rPr lang="en-US" smtClean="0"/>
               <a:pPr/>
-              <a:t>7/27/2015</a:t>
+              <a:t>3/30/2016</a:t>
             </a:fld>
             <a:endParaRPr lang="en-US"/>
           </a:p>
@@ -1046,7 +1062,7 @@
             <a:fld id="{1D8BD707-D9CF-40AE-B4C6-C98DA3205C09}" type="datetimeFigureOut">
               <a:rPr lang="en-US" smtClean="0"/>
               <a:pPr/>
-              <a:t>7/27/2015</a:t>
+              <a:t>3/30/2016</a:t>
             </a:fld>
             <a:endParaRPr lang="en-US"/>
           </a:p>
@@ -1331,7 +1347,7 @@
             <a:fld id="{1D8BD707-D9CF-40AE-B4C6-C98DA3205C09}" type="datetimeFigureOut">
               <a:rPr lang="en-US" smtClean="0"/>
               <a:pPr/>
-              <a:t>7/27/2015</a:t>
+              <a:t>3/30/2016</a:t>
             </a:fld>
             <a:endParaRPr lang="en-US"/>
           </a:p>
@@ -1750,7 +1766,7 @@
             <a:fld id="{1D8BD707-D9CF-40AE-B4C6-C98DA3205C09}" type="datetimeFigureOut">
               <a:rPr lang="en-US" smtClean="0"/>
               <a:pPr/>
-              <a:t>7/27/2015</a:t>
+              <a:t>3/30/2016</a:t>
             </a:fld>
             <a:endParaRPr lang="en-US"/>
           </a:p>
@@ -1865,7 +1881,7 @@
             <a:fld id="{1D8BD707-D9CF-40AE-B4C6-C98DA3205C09}" type="datetimeFigureOut">
               <a:rPr lang="en-US" smtClean="0"/>
               <a:pPr/>
-              <a:t>7/27/2015</a:t>
+              <a:t>3/30/2016</a:t>
             </a:fld>
             <a:endParaRPr lang="en-US"/>
           </a:p>
@@ -1957,7 +1973,7 @@
             <a:fld id="{1D8BD707-D9CF-40AE-B4C6-C98DA3205C09}" type="datetimeFigureOut">
               <a:rPr lang="en-US" smtClean="0"/>
               <a:pPr/>
-              <a:t>7/27/2015</a:t>
+              <a:t>3/30/2016</a:t>
             </a:fld>
             <a:endParaRPr lang="en-US"/>
           </a:p>
@@ -2231,7 +2247,7 @@
             <a:fld id="{1D8BD707-D9CF-40AE-B4C6-C98DA3205C09}" type="datetimeFigureOut">
               <a:rPr lang="en-US" smtClean="0"/>
               <a:pPr/>
-              <a:t>7/27/2015</a:t>
+              <a:t>3/30/2016</a:t>
             </a:fld>
             <a:endParaRPr lang="en-US"/>
           </a:p>
@@ -2481,7 +2497,7 @@
             <a:fld id="{1D8BD707-D9CF-40AE-B4C6-C98DA3205C09}" type="datetimeFigureOut">
               <a:rPr lang="en-US" smtClean="0"/>
               <a:pPr/>
-              <a:t>7/27/2015</a:t>
+              <a:t>3/30/2016</a:t>
             </a:fld>
             <a:endParaRPr lang="en-US"/>
           </a:p>
@@ -2691,7 +2707,7 @@
             <a:fld id="{1D8BD707-D9CF-40AE-B4C6-C98DA3205C09}" type="datetimeFigureOut">
               <a:rPr lang="en-US" smtClean="0"/>
               <a:pPr/>
-              <a:t>7/27/2015</a:t>
+              <a:t>3/30/2016</a:t>
             </a:fld>
             <a:endParaRPr lang="en-US"/>
           </a:p>
@@ -3070,8 +3086,8 @@
         </p:nvSpPr>
         <p:spPr>
           <a:xfrm>
-            <a:off x="6705599" y="3823022"/>
-            <a:ext cx="1447801" cy="2044377"/>
+            <a:off x="6705599" y="2908622"/>
+            <a:ext cx="1447801" cy="3263578"/>
           </a:xfrm>
           <a:prstGeom prst="roundRect">
             <a:avLst>
@@ -3121,8 +3137,8 @@
         </p:nvSpPr>
         <p:spPr>
           <a:xfrm>
-            <a:off x="1600200" y="1219200"/>
-            <a:ext cx="4876800" cy="4495800"/>
+            <a:off x="1600200" y="304800"/>
+            <a:ext cx="4876800" cy="5867400"/>
           </a:xfrm>
           <a:prstGeom prst="roundRect">
             <a:avLst>
@@ -3172,7 +3188,7 @@
         </p:nvSpPr>
         <p:spPr>
           <a:xfrm>
-            <a:off x="1752600" y="2667000"/>
+            <a:off x="1752600" y="1752600"/>
             <a:ext cx="1676400" cy="2133600"/>
           </a:xfrm>
           <a:prstGeom prst="rect">
@@ -3222,7 +3238,7 @@
         </p:nvSpPr>
         <p:spPr>
           <a:xfrm>
-            <a:off x="1752600" y="2057400"/>
+            <a:off x="1752600" y="1143000"/>
             <a:ext cx="1676400" cy="381000"/>
           </a:xfrm>
           <a:prstGeom prst="rect">
@@ -3272,7 +3288,7 @@
         </p:nvSpPr>
         <p:spPr>
           <a:xfrm>
-            <a:off x="4114800" y="2057400"/>
+            <a:off x="4114800" y="1143000"/>
             <a:ext cx="1333500" cy="2743200"/>
           </a:xfrm>
           <a:prstGeom prst="rect">
@@ -3322,7 +3338,7 @@
         </p:nvSpPr>
         <p:spPr>
           <a:xfrm>
-            <a:off x="5715000" y="2053936"/>
+            <a:off x="5715000" y="1139536"/>
             <a:ext cx="609600" cy="1222664"/>
           </a:xfrm>
           <a:prstGeom prst="rect">
@@ -3372,7 +3388,7 @@
         </p:nvSpPr>
         <p:spPr>
           <a:xfrm>
-            <a:off x="1759527" y="1333500"/>
+            <a:off x="1759527" y="419100"/>
             <a:ext cx="4565073" cy="342900"/>
           </a:xfrm>
           <a:prstGeom prst="rect">
@@ -3422,8 +3438,8 @@
         </p:nvSpPr>
         <p:spPr>
           <a:xfrm>
-            <a:off x="1759527" y="5219700"/>
-            <a:ext cx="3726873" cy="342900"/>
+            <a:off x="2590800" y="4305300"/>
+            <a:ext cx="2895600" cy="342900"/>
           </a:xfrm>
           <a:prstGeom prst="rect">
             <a:avLst/>
@@ -3472,7 +3488,7 @@
         </p:nvSpPr>
         <p:spPr>
           <a:xfrm>
-            <a:off x="6936512" y="3919682"/>
+            <a:off x="6936512" y="3005282"/>
             <a:ext cx="990600" cy="762000"/>
           </a:xfrm>
           <a:prstGeom prst="flowChartMagneticDisk">
@@ -3526,7 +3542,7 @@
         </p:nvSpPr>
         <p:spPr>
           <a:xfrm>
-            <a:off x="6957294" y="4845210"/>
+            <a:off x="6957294" y="3930810"/>
             <a:ext cx="969818" cy="717390"/>
           </a:xfrm>
           <a:prstGeom prst="foldedCorner">
@@ -3576,7 +3592,7 @@
         </p:nvSpPr>
         <p:spPr>
           <a:xfrm>
-            <a:off x="7031182" y="4953000"/>
+            <a:off x="7031182" y="4038600"/>
             <a:ext cx="969818" cy="695614"/>
           </a:xfrm>
           <a:prstGeom prst="foldedCorner">
@@ -3634,7 +3650,7 @@
         </p:nvSpPr>
         <p:spPr>
           <a:xfrm>
-            <a:off x="524719" y="3875299"/>
+            <a:off x="524719" y="2960899"/>
             <a:ext cx="468101" cy="468101"/>
           </a:xfrm>
           <a:prstGeom prst="smileyFace">
@@ -3684,7 +3700,7 @@
         </p:nvCxnSpPr>
         <p:spPr>
           <a:xfrm>
-            <a:off x="3429000" y="3410526"/>
+            <a:off x="3429000" y="2496126"/>
             <a:ext cx="685800" cy="0"/>
           </a:xfrm>
           <a:prstGeom prst="straightConnector1">
@@ -3724,7 +3740,7 @@
         </p:nvCxnSpPr>
         <p:spPr>
           <a:xfrm flipV="1">
-            <a:off x="2590800" y="2438400"/>
+            <a:off x="2590800" y="1524000"/>
             <a:ext cx="0" cy="228600"/>
           </a:xfrm>
           <a:prstGeom prst="straightConnector1">
@@ -3757,14 +3773,12 @@
       <p:cxnSp>
         <p:nvCxnSpPr>
           <p:cNvPr id="27" name="Straight Arrow Connector 26"/>
-          <p:cNvCxnSpPr>
-            <a:stCxn id="5" idx="2"/>
-          </p:cNvCxnSpPr>
+          <p:cNvCxnSpPr/>
           <p:nvPr/>
         </p:nvCxnSpPr>
         <p:spPr>
           <a:xfrm>
-            <a:off x="2590800" y="4800600"/>
+            <a:off x="2971800" y="3886200"/>
             <a:ext cx="0" cy="419100"/>
           </a:xfrm>
           <a:prstGeom prst="straightConnector1">
@@ -3801,7 +3815,7 @@
         </p:nvCxnSpPr>
         <p:spPr>
           <a:xfrm>
-            <a:off x="4791364" y="4800600"/>
+            <a:off x="4791364" y="3886200"/>
             <a:ext cx="0" cy="419100"/>
           </a:xfrm>
           <a:prstGeom prst="straightConnector1">
@@ -3838,7 +3852,7 @@
         </p:nvCxnSpPr>
         <p:spPr>
           <a:xfrm flipH="1">
-            <a:off x="3429000" y="3733799"/>
+            <a:off x="3429000" y="2819399"/>
             <a:ext cx="685800" cy="1"/>
           </a:xfrm>
           <a:prstGeom prst="straightConnector1">
@@ -3875,7 +3889,7 @@
         </p:nvCxnSpPr>
         <p:spPr>
           <a:xfrm flipV="1">
-            <a:off x="3669145" y="1676400"/>
+            <a:off x="3669145" y="762000"/>
             <a:ext cx="6927" cy="228600"/>
           </a:xfrm>
           <a:prstGeom prst="straightConnector1">
@@ -3913,7 +3927,7 @@
         </p:nvCxnSpPr>
         <p:spPr>
           <a:xfrm flipV="1">
-            <a:off x="4040909" y="1676400"/>
+            <a:off x="4040909" y="762000"/>
             <a:ext cx="6927" cy="228600"/>
           </a:xfrm>
           <a:prstGeom prst="straightConnector1">
@@ -3951,7 +3965,7 @@
         </p:nvCxnSpPr>
         <p:spPr>
           <a:xfrm flipV="1">
-            <a:off x="4412673" y="1676400"/>
+            <a:off x="4412673" y="762000"/>
             <a:ext cx="6927" cy="228600"/>
           </a:xfrm>
           <a:prstGeom prst="straightConnector1">
@@ -3991,7 +4005,7 @@
         </p:nvCxnSpPr>
         <p:spPr>
           <a:xfrm>
-            <a:off x="5448300" y="2665268"/>
+            <a:off x="5448300" y="1750868"/>
             <a:ext cx="266700" cy="0"/>
           </a:xfrm>
           <a:prstGeom prst="straightConnector1">
@@ -4030,8 +4044,8 @@
         </p:nvCxnSpPr>
         <p:spPr>
           <a:xfrm>
-            <a:off x="5486400" y="4300682"/>
-            <a:ext cx="1450112" cy="0"/>
+            <a:off x="5448300" y="3386282"/>
+            <a:ext cx="1488212" cy="0"/>
           </a:xfrm>
           <a:prstGeom prst="straightConnector1">
             <a:avLst/>
@@ -4069,7 +4083,7 @@
         </p:nvCxnSpPr>
         <p:spPr>
           <a:xfrm>
-            <a:off x="5486400" y="5391150"/>
+            <a:off x="5486400" y="4476750"/>
             <a:ext cx="1447800" cy="0"/>
           </a:xfrm>
           <a:prstGeom prst="straightConnector1">
@@ -4106,7 +4120,7 @@
         </p:nvCxnSpPr>
         <p:spPr>
           <a:xfrm>
-            <a:off x="1029856" y="4109349"/>
+            <a:off x="1029856" y="3194949"/>
             <a:ext cx="685800" cy="0"/>
           </a:xfrm>
           <a:prstGeom prst="straightConnector1">
@@ -4145,7 +4159,7 @@
         </p:nvSpPr>
         <p:spPr>
           <a:xfrm>
-            <a:off x="7168573" y="1333500"/>
+            <a:off x="7168573" y="419100"/>
             <a:ext cx="1465121" cy="762000"/>
           </a:xfrm>
           <a:prstGeom prst="cloud">
@@ -4202,7 +4216,7 @@
         </p:nvCxnSpPr>
         <p:spPr>
           <a:xfrm flipV="1">
-            <a:off x="6324600" y="2094689"/>
+            <a:off x="6324600" y="1180289"/>
             <a:ext cx="1576534" cy="570579"/>
           </a:xfrm>
           <a:prstGeom prst="bentConnector2">
@@ -4239,7 +4253,7 @@
         </p:nvSpPr>
         <p:spPr>
           <a:xfrm>
-            <a:off x="513174" y="1333501"/>
+            <a:off x="513174" y="419101"/>
             <a:ext cx="629826" cy="2063172"/>
           </a:xfrm>
           <a:prstGeom prst="rect">
@@ -4305,7 +4319,7 @@
         </p:nvCxnSpPr>
         <p:spPr>
           <a:xfrm>
-            <a:off x="1143000" y="2895600"/>
+            <a:off x="1143000" y="1981200"/>
             <a:ext cx="609600" cy="0"/>
           </a:xfrm>
           <a:prstGeom prst="straightConnector1">
@@ -4344,7 +4358,7 @@
         </p:nvCxnSpPr>
         <p:spPr>
           <a:xfrm>
-            <a:off x="1143000" y="1850416"/>
+            <a:off x="1143000" y="936016"/>
             <a:ext cx="1066800" cy="0"/>
           </a:xfrm>
           <a:prstGeom prst="straightConnector1">
@@ -4383,7 +4397,7 @@
         </p:nvCxnSpPr>
         <p:spPr>
           <a:xfrm>
-            <a:off x="1143000" y="1940468"/>
+            <a:off x="1143000" y="1026068"/>
             <a:ext cx="728639" cy="0"/>
           </a:xfrm>
           <a:prstGeom prst="straightConnector1">
@@ -4394,6 +4408,241 @@
               <a:schemeClr val="bg2">
                 <a:lumMod val="50000"/>
               </a:schemeClr>
+            </a:solidFill>
+            <a:headEnd type="none" w="med" len="med"/>
+            <a:tailEnd type="triangle" w="med" len="med"/>
+          </a:ln>
+        </p:spPr>
+        <p:style>
+          <a:lnRef idx="1">
+            <a:schemeClr val="accent1"/>
+          </a:lnRef>
+          <a:fillRef idx="0">
+            <a:schemeClr val="accent1"/>
+          </a:fillRef>
+          <a:effectRef idx="0">
+            <a:schemeClr val="accent1"/>
+          </a:effectRef>
+          <a:fontRef idx="minor">
+            <a:schemeClr val="tx1"/>
+          </a:fontRef>
+        </p:style>
+      </p:cxnSp>
+      <p:sp>
+        <p:nvSpPr>
+          <p:cNvPr id="34" name="Folded Corner 33"/>
+          <p:cNvSpPr/>
+          <p:nvPr/>
+        </p:nvSpPr>
+        <p:spPr>
+          <a:xfrm>
+            <a:off x="6957294" y="5140196"/>
+            <a:ext cx="969818" cy="717390"/>
+          </a:xfrm>
+          <a:prstGeom prst="foldedCorner">
+            <a:avLst/>
+          </a:prstGeom>
+          <a:solidFill>
+            <a:schemeClr val="bg1">
+              <a:lumMod val="75000"/>
+            </a:schemeClr>
+          </a:solidFill>
+          <a:ln w="12700">
+            <a:solidFill>
+              <a:schemeClr val="bg1"/>
+            </a:solidFill>
+          </a:ln>
+        </p:spPr>
+        <p:style>
+          <a:lnRef idx="2">
+            <a:schemeClr val="accent1">
+              <a:shade val="50000"/>
+            </a:schemeClr>
+          </a:lnRef>
+          <a:fillRef idx="1">
+            <a:schemeClr val="accent1"/>
+          </a:fillRef>
+          <a:effectRef idx="0">
+            <a:schemeClr val="accent1"/>
+          </a:effectRef>
+          <a:fontRef idx="minor">
+            <a:schemeClr val="lt1"/>
+          </a:fontRef>
+        </p:style>
+        <p:txBody>
+          <a:bodyPr rtlCol="0" anchor="ctr"/>
+          <a:lstStyle/>
+          <a:p>
+            <a:pPr algn="ctr"/>
+            <a:endParaRPr lang="en-SG"/>
+          </a:p>
+        </p:txBody>
+      </p:sp>
+      <p:sp>
+        <p:nvSpPr>
+          <p:cNvPr id="38" name="Folded Corner 37"/>
+          <p:cNvSpPr/>
+          <p:nvPr/>
+        </p:nvSpPr>
+        <p:spPr>
+          <a:xfrm>
+            <a:off x="7031182" y="5247986"/>
+            <a:ext cx="969818" cy="695614"/>
+          </a:xfrm>
+          <a:prstGeom prst="foldedCorner">
+            <a:avLst/>
+          </a:prstGeom>
+          <a:solidFill>
+            <a:schemeClr val="bg1">
+              <a:lumMod val="75000"/>
+            </a:schemeClr>
+          </a:solidFill>
+          <a:ln w="12700">
+            <a:solidFill>
+              <a:schemeClr val="bg1"/>
+            </a:solidFill>
+          </a:ln>
+        </p:spPr>
+        <p:style>
+          <a:lnRef idx="2">
+            <a:schemeClr val="accent1">
+              <a:shade val="50000"/>
+            </a:schemeClr>
+          </a:lnRef>
+          <a:fillRef idx="1">
+            <a:schemeClr val="accent1"/>
+          </a:fillRef>
+          <a:effectRef idx="0">
+            <a:schemeClr val="accent1"/>
+          </a:effectRef>
+          <a:fontRef idx="minor">
+            <a:schemeClr val="lt1"/>
+          </a:fontRef>
+        </p:style>
+        <p:txBody>
+          <a:bodyPr rtlCol="0" anchor="ctr"/>
+          <a:lstStyle/>
+          <a:p>
+            <a:pPr algn="ctr"/>
+            <a:r>
+              <a:rPr lang="en-US" dirty="0" smtClean="0"/>
+              <a:t>Update</a:t>
+            </a:r>
+          </a:p>
+          <a:p>
+            <a:pPr algn="ctr"/>
+            <a:r>
+              <a:rPr lang="en-US" dirty="0" smtClean="0"/>
+              <a:t>Data</a:t>
+            </a:r>
+            <a:endParaRPr lang="en-SG" dirty="0"/>
+          </a:p>
+        </p:txBody>
+      </p:sp>
+      <p:cxnSp>
+        <p:nvCxnSpPr>
+          <p:cNvPr id="39" name="Straight Arrow Connector 38"/>
+          <p:cNvCxnSpPr/>
+          <p:nvPr/>
+        </p:nvCxnSpPr>
+        <p:spPr>
+          <a:xfrm>
+            <a:off x="2133600" y="3886200"/>
+            <a:ext cx="0" cy="1524000"/>
+          </a:xfrm>
+          <a:prstGeom prst="straightConnector1">
+            <a:avLst/>
+          </a:prstGeom>
+          <a:ln w="28575">
+            <a:solidFill>
+              <a:srgbClr val="7030A0"/>
+            </a:solidFill>
+            <a:headEnd type="none" w="med" len="med"/>
+            <a:tailEnd type="triangle" w="med" len="med"/>
+          </a:ln>
+        </p:spPr>
+        <p:style>
+          <a:lnRef idx="1">
+            <a:schemeClr val="accent1"/>
+          </a:lnRef>
+          <a:fillRef idx="0">
+            <a:schemeClr val="accent1"/>
+          </a:fillRef>
+          <a:effectRef idx="0">
+            <a:schemeClr val="accent1"/>
+          </a:effectRef>
+          <a:fontRef idx="minor">
+            <a:schemeClr val="tx1"/>
+          </a:fontRef>
+        </p:style>
+      </p:cxnSp>
+      <p:sp>
+        <p:nvSpPr>
+          <p:cNvPr id="40" name="Rectangle 39"/>
+          <p:cNvSpPr/>
+          <p:nvPr/>
+        </p:nvSpPr>
+        <p:spPr>
+          <a:xfrm>
+            <a:off x="1759527" y="5410200"/>
+            <a:ext cx="3726873" cy="342900"/>
+          </a:xfrm>
+          <a:prstGeom prst="rect">
+            <a:avLst/>
+          </a:prstGeom>
+          <a:solidFill>
+            <a:srgbClr val="FFC000"/>
+          </a:solidFill>
+          <a:ln>
+            <a:noFill/>
+          </a:ln>
+        </p:spPr>
+        <p:style>
+          <a:lnRef idx="2">
+            <a:schemeClr val="accent1">
+              <a:shade val="50000"/>
+            </a:schemeClr>
+          </a:lnRef>
+          <a:fillRef idx="1">
+            <a:schemeClr val="accent1"/>
+          </a:fillRef>
+          <a:effectRef idx="0">
+            <a:schemeClr val="accent1"/>
+          </a:effectRef>
+          <a:fontRef idx="minor">
+            <a:schemeClr val="lt1"/>
+          </a:fontRef>
+        </p:style>
+        <p:txBody>
+          <a:bodyPr rtlCol="0" anchor="ctr"/>
+          <a:lstStyle/>
+          <a:p>
+            <a:pPr algn="ctr"/>
+            <a:r>
+              <a:rPr lang="en-US" dirty="0" smtClean="0"/>
+              <a:t>Updater</a:t>
+            </a:r>
+            <a:endParaRPr lang="en-SG" dirty="0"/>
+          </a:p>
+        </p:txBody>
+      </p:sp>
+      <p:cxnSp>
+        <p:nvCxnSpPr>
+          <p:cNvPr id="42" name="Straight Arrow Connector 41"/>
+          <p:cNvCxnSpPr/>
+          <p:nvPr/>
+        </p:nvCxnSpPr>
+        <p:spPr>
+          <a:xfrm>
+            <a:off x="5448300" y="5562600"/>
+            <a:ext cx="1447800" cy="0"/>
+          </a:xfrm>
+          <a:prstGeom prst="straightConnector1">
+            <a:avLst/>
+          </a:prstGeom>
+          <a:ln w="28575">
+            <a:solidFill>
+              <a:srgbClr val="FFC000"/>
             </a:solidFill>
             <a:headEnd type="none" w="med" len="med"/>
             <a:tailEnd type="triangle" w="med" len="med"/>

</xml_diff>